<commit_message>
Added accordion, popovers, finished pptx, all done
</commit_message>
<xml_diff>
--- a/presentation.pptx
+++ b/presentation.pptx
@@ -5,12 +5,16 @@
     <p:sldMasterId id="2147483696" r:id="rId4"/>
   </p:sldMasterIdLst>
   <p:notesMasterIdLst>
-    <p:notesMasterId r:id="rId8"/>
+    <p:notesMasterId r:id="rId12"/>
   </p:notesMasterIdLst>
   <p:sldIdLst>
     <p:sldId id="306" r:id="rId5"/>
     <p:sldId id="307" r:id="rId6"/>
     <p:sldId id="314" r:id="rId7"/>
+    <p:sldId id="315" r:id="rId8"/>
+    <p:sldId id="319" r:id="rId9"/>
+    <p:sldId id="316" r:id="rId10"/>
+    <p:sldId id="317" r:id="rId11"/>
   </p:sldIdLst>
   <p:sldSz cx="12192000" cy="6858000"/>
   <p:notesSz cx="6858000" cy="9144000"/>
@@ -221,7 +225,7 @@
           <a:p>
             <a:fld id="{5EA28068-AFBD-4979-B752-9EB6F90B1386}" type="datetimeFigureOut">
               <a:rPr lang="en-US" smtClean="0"/>
-              <a:t>11/3/2022</a:t>
+              <a:t>11/4/2022</a:t>
             </a:fld>
             <a:endParaRPr lang="en-US" dirty="0"/>
           </a:p>
@@ -11307,14 +11311,16 @@
           <p:nvPr/>
         </p:nvPicPr>
         <p:blipFill>
-          <a:blip r:embed="rId2"/>
+          <a:blip r:embed="rId2">
+            <a:biLevel thresh="25000"/>
+          </a:blip>
           <a:stretch>
             <a:fillRect/>
           </a:stretch>
         </p:blipFill>
         <p:spPr>
           <a:xfrm>
-            <a:off x="9289774" y="1803632"/>
+            <a:off x="9289774" y="2031403"/>
             <a:ext cx="1445282" cy="1406741"/>
           </a:xfrm>
           <a:prstGeom prst="rect">
@@ -11374,13 +11380,13 @@
           <a:lstStyle/>
           <a:p>
             <a:r>
-              <a:rPr lang="en-US" b="1" cap="all" spc="400" dirty="0">
+              <a:rPr lang="en-US" b="1" cap="all" spc="400">
                 <a:solidFill>
                   <a:schemeClr val="tx1"/>
                 </a:solidFill>
                 <a:latin typeface="+mn-lt"/>
               </a:rPr>
-              <a:t>Agenda</a:t>
+              <a:t>contents</a:t>
             </a:r>
             <a:endParaRPr lang="en-US" dirty="0">
               <a:solidFill>
@@ -11406,17 +11412,24 @@
             <p:ph type="body" sz="quarter" idx="13"/>
           </p:nvPr>
         </p:nvSpPr>
-        <p:spPr/>
+        <p:spPr>
+          <a:xfrm>
+            <a:off x="6096000" y="3127248"/>
+            <a:ext cx="4940808" cy="3118104"/>
+          </a:xfrm>
+        </p:spPr>
         <p:txBody>
           <a:bodyPr>
-            <a:normAutofit/>
+            <a:normAutofit fontScale="85000" lnSpcReduction="10000"/>
           </a:bodyPr>
           <a:lstStyle/>
           <a:p>
-            <a:pPr algn="r">
+            <a:pPr marL="457200" indent="-457200" algn="l">
               <a:lnSpc>
                 <a:spcPct val="150000"/>
               </a:lnSpc>
+              <a:buFont typeface="Arial" panose="020B0604020202020204" pitchFamily="34" charset="0"/>
+              <a:buChar char="•"/>
             </a:pPr>
             <a:r>
               <a:rPr lang="en-US" sz="2800">
@@ -11433,10 +11446,12 @@
             </a:endParaRPr>
           </a:p>
           <a:p>
-            <a:pPr algn="r">
+            <a:pPr marL="457200" indent="-457200" algn="l">
               <a:lnSpc>
                 <a:spcPct val="150000"/>
               </a:lnSpc>
+              <a:buFont typeface="Arial" panose="020B0604020202020204" pitchFamily="34" charset="0"/>
+              <a:buChar char="•"/>
             </a:pPr>
             <a:r>
               <a:rPr lang="en-US" sz="2800">
@@ -11444,19 +11459,16 @@
                   <a:schemeClr val="tx1"/>
                 </a:solidFill>
               </a:rPr>
-              <a:t>animations</a:t>
+              <a:t>jQuery effects</a:t>
             </a:r>
-            <a:endParaRPr lang="en-US" sz="2800" dirty="0">
-              <a:solidFill>
-                <a:schemeClr val="tx1"/>
-              </a:solidFill>
-            </a:endParaRPr>
-          </a:p>
-          <a:p>
-            <a:pPr algn="r">
+          </a:p>
+          <a:p>
+            <a:pPr marL="457200" indent="-457200" algn="l">
               <a:lnSpc>
                 <a:spcPct val="150000"/>
               </a:lnSpc>
+              <a:buFont typeface="Arial" panose="020B0604020202020204" pitchFamily="34" charset="0"/>
+              <a:buChar char="•"/>
             </a:pPr>
             <a:r>
               <a:rPr lang="en-US" sz="2800">
@@ -11464,14 +11476,38 @@
                   <a:schemeClr val="tx1"/>
                 </a:solidFill>
               </a:rPr>
-              <a:t>functions</a:t>
+              <a:t>Bootstrap extras</a:t>
             </a:r>
-          </a:p>
-          <a:p>
-            <a:pPr algn="r">
+            <a:endParaRPr lang="en-US" sz="2800" dirty="0">
+              <a:solidFill>
+                <a:schemeClr val="tx1"/>
+              </a:solidFill>
+            </a:endParaRPr>
+          </a:p>
+          <a:p>
+            <a:pPr marL="457200" indent="-457200" algn="l">
               <a:lnSpc>
                 <a:spcPct val="150000"/>
               </a:lnSpc>
+              <a:buFont typeface="Arial" panose="020B0604020202020204" pitchFamily="34" charset="0"/>
+              <a:buChar char="•"/>
+            </a:pPr>
+            <a:r>
+              <a:rPr lang="en-US" sz="2800">
+                <a:solidFill>
+                  <a:schemeClr val="tx1"/>
+                </a:solidFill>
+              </a:rPr>
+              <a:t>functions per page</a:t>
+            </a:r>
+          </a:p>
+          <a:p>
+            <a:pPr marL="457200" indent="-457200" algn="l">
+              <a:lnSpc>
+                <a:spcPct val="150000"/>
+              </a:lnSpc>
+              <a:buFont typeface="Arial" panose="020B0604020202020204" pitchFamily="34" charset="0"/>
+              <a:buChar char="•"/>
             </a:pPr>
             <a:r>
               <a:rPr lang="en-US" sz="2800">
@@ -11489,36 +11525,6 @@
           </a:p>
         </p:txBody>
       </p:sp>
-      <p:sp>
-        <p:nvSpPr>
-          <p:cNvPr id="9" name="Slide Number Placeholder 8">
-            <a:extLst>
-              <a:ext uri="{FF2B5EF4-FFF2-40B4-BE49-F238E27FC236}">
-                <a16:creationId xmlns:a16="http://schemas.microsoft.com/office/drawing/2014/main" id="{6DCF8D89-56D9-4E2B-9838-07DFB6E9D2BB}"/>
-              </a:ext>
-            </a:extLst>
-          </p:cNvPr>
-          <p:cNvSpPr>
-            <a:spLocks noGrp="1"/>
-          </p:cNvSpPr>
-          <p:nvPr>
-            <p:ph type="sldNum" sz="quarter" idx="12"/>
-          </p:nvPr>
-        </p:nvSpPr>
-        <p:spPr/>
-        <p:txBody>
-          <a:bodyPr/>
-          <a:lstStyle/>
-          <a:p>
-            <a:fld id="{D8DA9DAA-006C-4F4B-980E-E3DF019B24E2}" type="slidenum">
-              <a:rPr lang="en-US" smtClean="0"/>
-              <a:pPr/>
-              <a:t>2</a:t>
-            </a:fld>
-            <a:endParaRPr lang="en-US" dirty="0"/>
-          </a:p>
-        </p:txBody>
-      </p:sp>
       <p:pic>
         <p:nvPicPr>
           <p:cNvPr id="11" name="Picture Placeholder 10" descr="Icon&#10;&#10;Description automatically generated">
@@ -11536,13 +11542,23 @@
           </p:nvPr>
         </p:nvPicPr>
         <p:blipFill>
-          <a:blip r:embed="rId2"/>
+          <a:blip r:embed="rId2">
+            <a:alphaModFix/>
+          </a:blip>
           <a:srcRect/>
           <a:stretch>
             <a:fillRect/>
           </a:stretch>
         </p:blipFill>
-        <p:spPr/>
+        <p:spPr>
+          <a:effectLst>
+            <a:outerShdw blurRad="76200" dir="18900000" sy="23000" kx="-1200000" algn="bl" rotWithShape="0">
+              <a:prstClr val="black">
+                <a:alpha val="20000"/>
+              </a:prstClr>
+            </a:outerShdw>
+          </a:effectLst>
+        </p:spPr>
       </p:pic>
     </p:spTree>
     <p:extLst>
@@ -11574,41 +11590,12 @@
           <a:chExt cx="0" cy="0"/>
         </a:xfrm>
       </p:grpSpPr>
-      <p:sp>
-        <p:nvSpPr>
-          <p:cNvPr id="5" name="Slide Number Placeholder 4">
-            <a:extLst>
-              <a:ext uri="{FF2B5EF4-FFF2-40B4-BE49-F238E27FC236}">
-                <a16:creationId xmlns:a16="http://schemas.microsoft.com/office/drawing/2014/main" id="{59C819D2-5D3A-4C22-97C2-6CE8D152F6D1}"/>
-              </a:ext>
-            </a:extLst>
-          </p:cNvPr>
-          <p:cNvSpPr>
-            <a:spLocks noGrp="1"/>
-          </p:cNvSpPr>
-          <p:nvPr>
-            <p:ph type="sldNum" sz="quarter" idx="12"/>
-          </p:nvPr>
-        </p:nvSpPr>
-        <p:spPr/>
-        <p:txBody>
-          <a:bodyPr/>
-          <a:lstStyle/>
-          <a:p>
-            <a:fld id="{D8DA9DAA-006C-4F4B-980E-E3DF019B24E2}" type="slidenum">
-              <a:rPr lang="en-US" smtClean="0"/>
-              <a:t>3</a:t>
-            </a:fld>
-            <a:endParaRPr lang="en-US" dirty="0"/>
-          </a:p>
-        </p:txBody>
-      </p:sp>
       <p:pic>
         <p:nvPicPr>
-          <p:cNvPr id="17" name="Picture 16">
-            <a:extLst>
-              <a:ext uri="{FF2B5EF4-FFF2-40B4-BE49-F238E27FC236}">
-                <a16:creationId xmlns:a16="http://schemas.microsoft.com/office/drawing/2014/main" id="{E68B6068-03D9-41D4-9117-70FA86D9A379}"/>
+          <p:cNvPr id="7" name="Picture 6">
+            <a:extLst>
+              <a:ext uri="{FF2B5EF4-FFF2-40B4-BE49-F238E27FC236}">
+                <a16:creationId xmlns:a16="http://schemas.microsoft.com/office/drawing/2014/main" id="{896CEFCE-BE12-4521-AF63-1AF2D45528CD}"/>
               </a:ext>
             </a:extLst>
           </p:cNvPr>
@@ -11625,8 +11612,8 @@
         </p:blipFill>
         <p:spPr>
           <a:xfrm>
-            <a:off x="915641" y="352508"/>
-            <a:ext cx="10786029" cy="5708765"/>
+            <a:off x="1033255" y="418054"/>
+            <a:ext cx="10734675" cy="6021891"/>
           </a:xfrm>
           <a:prstGeom prst="rect">
             <a:avLst/>
@@ -11651,7 +11638,7 @@
         </p:nvSpPr>
         <p:spPr>
           <a:xfrm>
-            <a:off x="1033255" y="3206890"/>
+            <a:off x="1033255" y="4398592"/>
             <a:ext cx="3909806" cy="1325563"/>
           </a:xfrm>
         </p:spPr>
@@ -11667,10 +11654,2728 @@
           </a:p>
         </p:txBody>
       </p:sp>
+      <p:sp>
+        <p:nvSpPr>
+          <p:cNvPr id="3" name="TextBox 2">
+            <a:extLst>
+              <a:ext uri="{FF2B5EF4-FFF2-40B4-BE49-F238E27FC236}">
+                <a16:creationId xmlns:a16="http://schemas.microsoft.com/office/drawing/2014/main" id="{15FB67A3-6416-4B2B-A95B-9AB880B5935C}"/>
+              </a:ext>
+            </a:extLst>
+          </p:cNvPr>
+          <p:cNvSpPr txBox="1"/>
+          <p:nvPr/>
+        </p:nvSpPr>
+        <p:spPr>
+          <a:xfrm>
+            <a:off x="1033255" y="5964596"/>
+            <a:ext cx="6533736" cy="369332"/>
+          </a:xfrm>
+          <a:prstGeom prst="rect">
+            <a:avLst/>
+          </a:prstGeom>
+        </p:spPr>
+        <p:txBody>
+          <a:bodyPr vert="horz" lIns="91440" tIns="45720" rIns="91440" bIns="45720" rtlCol="0" anchor="ctr">
+            <a:normAutofit/>
+          </a:bodyPr>
+          <a:lstStyle>
+            <a:lvl1pPr>
+              <a:lnSpc>
+                <a:spcPct val="90000"/>
+              </a:lnSpc>
+              <a:spcBef>
+                <a:spcPct val="0"/>
+              </a:spcBef>
+              <a:buNone/>
+              <a:defRPr sz="4400">
+                <a:latin typeface="+mj-lt"/>
+                <a:ea typeface="+mj-ea"/>
+                <a:cs typeface="+mj-cs"/>
+              </a:defRPr>
+            </a:lvl1pPr>
+          </a:lstStyle>
+          <a:p>
+            <a:r>
+              <a:rPr lang="en-GB" sz="2000"/>
+              <a:t>“So fast it can run an infinite loop in 6 seconds”</a:t>
+            </a:r>
+            <a:endParaRPr lang="en-US" sz="2000"/>
+          </a:p>
+        </p:txBody>
+      </p:sp>
     </p:spTree>
     <p:extLst>
       <p:ext uri="{BB962C8B-B14F-4D97-AF65-F5344CB8AC3E}">
         <p14:creationId xmlns:p14="http://schemas.microsoft.com/office/powerpoint/2010/main" val="2376176795"/>
+      </p:ext>
+    </p:extLst>
+  </p:cSld>
+  <p:clrMapOvr>
+    <a:masterClrMapping/>
+  </p:clrMapOvr>
+</p:sld>
+</file>
+
+<file path=ppt/slides/slide4.xml><?xml version="1.0" encoding="utf-8"?>
+<p:sld xmlns:a="http://schemas.openxmlformats.org/drawingml/2006/main" xmlns:r="http://schemas.openxmlformats.org/officeDocument/2006/relationships" xmlns:p="http://schemas.openxmlformats.org/presentationml/2006/main">
+  <p:cSld>
+    <p:bg>
+      <p:bgPr>
+        <a:solidFill>
+          <a:schemeClr val="bg1"/>
+        </a:solidFill>
+        <a:effectLst/>
+      </p:bgPr>
+    </p:bg>
+    <p:spTree>
+      <p:nvGrpSpPr>
+        <p:cNvPr id="1" name=""/>
+        <p:cNvGrpSpPr/>
+        <p:nvPr/>
+      </p:nvGrpSpPr>
+      <p:grpSpPr>
+        <a:xfrm>
+          <a:off x="0" y="0"/>
+          <a:ext cx="0" cy="0"/>
+          <a:chOff x="0" y="0"/>
+          <a:chExt cx="0" cy="0"/>
+        </a:xfrm>
+      </p:grpSpPr>
+      <p:cxnSp>
+        <p:nvCxnSpPr>
+          <p:cNvPr id="25" name="Straight Connector 10">
+            <a:extLst>
+              <a:ext uri="{FF2B5EF4-FFF2-40B4-BE49-F238E27FC236}">
+                <a16:creationId xmlns:a16="http://schemas.microsoft.com/office/drawing/2014/main" id="{5C05CAAB-DBA2-4548-AD5F-01BB97FBB207}"/>
+              </a:ext>
+              <a:ext uri="{C183D7F6-B498-43B3-948B-1728B52AA6E4}">
+                <adec:decorative xmlns:adec="http://schemas.microsoft.com/office/drawing/2017/decorative" val="1"/>
+              </a:ext>
+            </a:extLst>
+          </p:cNvPr>
+          <p:cNvCxnSpPr>
+            <a:cxnSpLocks noGrp="1" noRot="1" noChangeAspect="1" noMove="1" noResize="1" noEditPoints="1" noAdjustHandles="1" noChangeArrowheads="1" noChangeShapeType="1"/>
+          </p:cNvCxnSpPr>
+          <p:nvPr>
+            <p:extLst>
+              <p:ext uri="{386F3935-93C4-4BCD-93E2-E3B085C9AB24}">
+                <p16:designElem xmlns:p16="http://schemas.microsoft.com/office/powerpoint/2015/main" val="1"/>
+              </p:ext>
+            </p:extLst>
+          </p:nvPr>
+        </p:nvCxnSpPr>
+        <p:spPr>
+          <a:xfrm>
+            <a:off x="715890" y="356812"/>
+            <a:ext cx="0" cy="6492875"/>
+          </a:xfrm>
+          <a:prstGeom prst="line">
+            <a:avLst/>
+          </a:prstGeom>
+          <a:ln w="25400" cap="sq">
+            <a:gradFill flip="none" rotWithShape="1">
+              <a:gsLst>
+                <a:gs pos="0">
+                  <a:schemeClr val="accent2"/>
+                </a:gs>
+                <a:gs pos="100000">
+                  <a:schemeClr val="accent4"/>
+                </a:gs>
+              </a:gsLst>
+              <a:lin ang="16200000" scaled="1"/>
+              <a:tileRect/>
+            </a:gradFill>
+            <a:bevel/>
+          </a:ln>
+        </p:spPr>
+        <p:style>
+          <a:lnRef idx="1">
+            <a:schemeClr val="accent1"/>
+          </a:lnRef>
+          <a:fillRef idx="0">
+            <a:schemeClr val="accent1"/>
+          </a:fillRef>
+          <a:effectRef idx="0">
+            <a:schemeClr val="accent1"/>
+          </a:effectRef>
+          <a:fontRef idx="minor">
+            <a:schemeClr val="tx1"/>
+          </a:fontRef>
+        </p:style>
+      </p:cxnSp>
+      <p:sp useBgFill="1">
+        <p:nvSpPr>
+          <p:cNvPr id="26" name="Rectangle 12">
+            <a:extLst>
+              <a:ext uri="{FF2B5EF4-FFF2-40B4-BE49-F238E27FC236}">
+                <a16:creationId xmlns:a16="http://schemas.microsoft.com/office/drawing/2014/main" id="{8D1AA55E-40D5-461B-A5A8-4AE8AAB71B08}"/>
+              </a:ext>
+              <a:ext uri="{C183D7F6-B498-43B3-948B-1728B52AA6E4}">
+                <adec:decorative xmlns:adec="http://schemas.microsoft.com/office/drawing/2017/decorative" val="1"/>
+              </a:ext>
+            </a:extLst>
+          </p:cNvPr>
+          <p:cNvSpPr>
+            <a:spLocks noGrp="1" noRot="1" noChangeAspect="1" noMove="1" noResize="1" noEditPoints="1" noAdjustHandles="1" noChangeArrowheads="1" noChangeShapeType="1" noTextEdit="1"/>
+          </p:cNvSpPr>
+          <p:nvPr>
+            <p:extLst>
+              <p:ext uri="{386F3935-93C4-4BCD-93E2-E3B085C9AB24}">
+                <p16:designElem xmlns:p16="http://schemas.microsoft.com/office/powerpoint/2015/main" val="1"/>
+              </p:ext>
+            </p:extLst>
+          </p:nvPr>
+        </p:nvSpPr>
+        <p:spPr>
+          <a:xfrm>
+            <a:off x="0" y="0"/>
+            <a:ext cx="12192000" cy="6858000"/>
+          </a:xfrm>
+          <a:prstGeom prst="rect">
+            <a:avLst/>
+          </a:prstGeom>
+          <a:ln>
+            <a:noFill/>
+          </a:ln>
+        </p:spPr>
+        <p:style>
+          <a:lnRef idx="2">
+            <a:schemeClr val="accent1">
+              <a:shade val="50000"/>
+            </a:schemeClr>
+          </a:lnRef>
+          <a:fillRef idx="1">
+            <a:schemeClr val="accent1"/>
+          </a:fillRef>
+          <a:effectRef idx="0">
+            <a:schemeClr val="accent1"/>
+          </a:effectRef>
+          <a:fontRef idx="minor">
+            <a:schemeClr val="lt1"/>
+          </a:fontRef>
+        </p:style>
+        <p:txBody>
+          <a:bodyPr rtlCol="0" anchor="ctr"/>
+          <a:lstStyle/>
+          <a:p>
+            <a:pPr algn="ctr"/>
+            <a:endParaRPr lang="en-US" dirty="0"/>
+          </a:p>
+        </p:txBody>
+      </p:sp>
+      <p:sp>
+        <p:nvSpPr>
+          <p:cNvPr id="3" name="Title 2">
+            <a:extLst>
+              <a:ext uri="{FF2B5EF4-FFF2-40B4-BE49-F238E27FC236}">
+                <a16:creationId xmlns:a16="http://schemas.microsoft.com/office/drawing/2014/main" id="{279BB9AE-D21F-43E9-8399-3429C51F7AA3}"/>
+              </a:ext>
+            </a:extLst>
+          </p:cNvPr>
+          <p:cNvSpPr>
+            <a:spLocks noGrp="1"/>
+          </p:cNvSpPr>
+          <p:nvPr>
+            <p:ph type="title"/>
+          </p:nvPr>
+        </p:nvSpPr>
+        <p:spPr>
+          <a:xfrm>
+            <a:off x="803776" y="1336390"/>
+            <a:ext cx="6190412" cy="1182927"/>
+          </a:xfrm>
+        </p:spPr>
+        <p:txBody>
+          <a:bodyPr vert="horz" lIns="91440" tIns="45720" rIns="91440" bIns="45720" rtlCol="0" anchor="b">
+            <a:normAutofit/>
+          </a:bodyPr>
+          <a:lstStyle/>
+          <a:p>
+            <a:r>
+              <a:rPr lang="en-US" kern="1200">
+                <a:solidFill>
+                  <a:schemeClr val="tx1"/>
+                </a:solidFill>
+                <a:latin typeface="+mj-lt"/>
+                <a:ea typeface="+mj-ea"/>
+                <a:cs typeface="+mj-cs"/>
+              </a:rPr>
+              <a:t>jQuery Effects</a:t>
+            </a:r>
+          </a:p>
+        </p:txBody>
+      </p:sp>
+      <p:cxnSp>
+        <p:nvCxnSpPr>
+          <p:cNvPr id="27" name="!!Straight Connector">
+            <a:extLst>
+              <a:ext uri="{FF2B5EF4-FFF2-40B4-BE49-F238E27FC236}">
+                <a16:creationId xmlns:a16="http://schemas.microsoft.com/office/drawing/2014/main" id="{7EB498BD-8089-4626-91EA-4978EBEF535E}"/>
+              </a:ext>
+              <a:ext uri="{C183D7F6-B498-43B3-948B-1728B52AA6E4}">
+                <adec:decorative xmlns:adec="http://schemas.microsoft.com/office/drawing/2017/decorative" val="1"/>
+              </a:ext>
+            </a:extLst>
+          </p:cNvPr>
+          <p:cNvCxnSpPr>
+            <a:cxnSpLocks noGrp="1" noRot="1" noChangeAspect="1" noMove="1" noResize="1" noEditPoints="1" noAdjustHandles="1" noChangeArrowheads="1" noChangeShapeType="1"/>
+          </p:cNvCxnSpPr>
+          <p:nvPr>
+            <p:extLst>
+              <p:ext uri="{386F3935-93C4-4BCD-93E2-E3B085C9AB24}">
+                <p16:designElem xmlns:p16="http://schemas.microsoft.com/office/powerpoint/2015/main" val="1"/>
+              </p:ext>
+            </p:extLst>
+          </p:nvPr>
+        </p:nvCxnSpPr>
+        <p:spPr>
+          <a:xfrm>
+            <a:off x="0" y="806470"/>
+            <a:ext cx="7903723" cy="0"/>
+          </a:xfrm>
+          <a:prstGeom prst="line">
+            <a:avLst/>
+          </a:prstGeom>
+          <a:ln w="25400" cap="sq">
+            <a:gradFill flip="none" rotWithShape="1">
+              <a:gsLst>
+                <a:gs pos="0">
+                  <a:schemeClr val="accent2"/>
+                </a:gs>
+                <a:gs pos="100000">
+                  <a:schemeClr val="accent4"/>
+                </a:gs>
+              </a:gsLst>
+              <a:lin ang="10800000" scaled="1"/>
+              <a:tileRect/>
+            </a:gradFill>
+            <a:bevel/>
+          </a:ln>
+        </p:spPr>
+        <p:style>
+          <a:lnRef idx="1">
+            <a:schemeClr val="accent1"/>
+          </a:lnRef>
+          <a:fillRef idx="0">
+            <a:schemeClr val="accent1"/>
+          </a:fillRef>
+          <a:effectRef idx="0">
+            <a:schemeClr val="accent1"/>
+          </a:effectRef>
+          <a:fontRef idx="minor">
+            <a:schemeClr val="tx1"/>
+          </a:fontRef>
+        </p:style>
+      </p:cxnSp>
+      <p:sp>
+        <p:nvSpPr>
+          <p:cNvPr id="4" name="Content Placeholder 3">
+            <a:extLst>
+              <a:ext uri="{FF2B5EF4-FFF2-40B4-BE49-F238E27FC236}">
+                <a16:creationId xmlns:a16="http://schemas.microsoft.com/office/drawing/2014/main" id="{1B896FA2-B4AC-45A4-A924-21C050075EFD}"/>
+              </a:ext>
+            </a:extLst>
+          </p:cNvPr>
+          <p:cNvSpPr>
+            <a:spLocks noGrp="1"/>
+          </p:cNvSpPr>
+          <p:nvPr>
+            <p:ph idx="1"/>
+          </p:nvPr>
+        </p:nvSpPr>
+        <p:spPr>
+          <a:xfrm>
+            <a:off x="803776" y="2829330"/>
+            <a:ext cx="6190412" cy="3344459"/>
+          </a:xfrm>
+        </p:spPr>
+        <p:txBody>
+          <a:bodyPr vert="horz" lIns="91440" tIns="45720" rIns="91440" bIns="45720" rtlCol="0" anchor="t">
+            <a:normAutofit/>
+          </a:bodyPr>
+          <a:lstStyle/>
+          <a:p>
+            <a:pPr marL="342900" indent="-228600">
+              <a:lnSpc>
+                <a:spcPct val="150000"/>
+              </a:lnSpc>
+              <a:buFont typeface="Arial" panose="020B0604020202020204" pitchFamily="34" charset="0"/>
+              <a:buChar char="•"/>
+            </a:pPr>
+            <a:endParaRPr lang="en-US" sz="2400"/>
+          </a:p>
+          <a:p>
+            <a:pPr marL="342900" indent="-228600">
+              <a:lnSpc>
+                <a:spcPct val="150000"/>
+              </a:lnSpc>
+              <a:buFont typeface="Arial" panose="020B0604020202020204" pitchFamily="34" charset="0"/>
+              <a:buChar char="•"/>
+            </a:pPr>
+            <a:r>
+              <a:rPr lang="en-US" sz="2400"/>
+              <a:t>fading text</a:t>
+            </a:r>
+          </a:p>
+          <a:p>
+            <a:pPr marL="342900" indent="-228600">
+              <a:lnSpc>
+                <a:spcPct val="150000"/>
+              </a:lnSpc>
+              <a:buFont typeface="Arial" panose="020B0604020202020204" pitchFamily="34" charset="0"/>
+              <a:buChar char="•"/>
+            </a:pPr>
+            <a:r>
+              <a:rPr lang="en-US" sz="2400"/>
+              <a:t>making text of links bold</a:t>
+            </a:r>
+          </a:p>
+          <a:p>
+            <a:pPr marL="342900" indent="-228600">
+              <a:lnSpc>
+                <a:spcPct val="150000"/>
+              </a:lnSpc>
+              <a:buFont typeface="Arial" panose="020B0604020202020204" pitchFamily="34" charset="0"/>
+              <a:buChar char="•"/>
+            </a:pPr>
+            <a:r>
+              <a:rPr lang="en-US" sz="2400"/>
+              <a:t>animating cards</a:t>
+            </a:r>
+          </a:p>
+          <a:p>
+            <a:pPr marL="342900" indent="-228600">
+              <a:lnSpc>
+                <a:spcPct val="90000"/>
+              </a:lnSpc>
+              <a:buFont typeface="Arial" panose="020B0604020202020204" pitchFamily="34" charset="0"/>
+              <a:buChar char="•"/>
+            </a:pPr>
+            <a:endParaRPr lang="en-US" sz="1800"/>
+          </a:p>
+        </p:txBody>
+      </p:sp>
+      <p:pic>
+        <p:nvPicPr>
+          <p:cNvPr id="6" name="Picture Placeholder 5" descr="A yellow sign on a wood surface&#10;&#10;Description automatically generated with medium confidence">
+            <a:extLst>
+              <a:ext uri="{FF2B5EF4-FFF2-40B4-BE49-F238E27FC236}">
+                <a16:creationId xmlns:a16="http://schemas.microsoft.com/office/drawing/2014/main" id="{A3BCE85B-BF70-4CE2-8742-FE7BA2647544}"/>
+              </a:ext>
+            </a:extLst>
+          </p:cNvPr>
+          <p:cNvPicPr>
+            <a:picLocks noGrp="1" noChangeAspect="1"/>
+          </p:cNvPicPr>
+          <p:nvPr>
+            <p:ph type="pic" sz="quarter" idx="13"/>
+          </p:nvPr>
+        </p:nvPicPr>
+        <p:blipFill rotWithShape="1">
+          <a:blip r:embed="rId2"/>
+          <a:srcRect l="22195" r="21555" b="-2"/>
+          <a:stretch/>
+        </p:blipFill>
+        <p:spPr>
+          <a:xfrm>
+            <a:off x="7451965" y="1665520"/>
+            <a:ext cx="4266960" cy="4266968"/>
+          </a:xfrm>
+          <a:custGeom>
+            <a:avLst/>
+            <a:gdLst/>
+            <a:ahLst/>
+            <a:cxnLst/>
+            <a:rect l="l" t="t" r="r" b="b"/>
+            <a:pathLst>
+              <a:path w="2457864" h="2457864">
+                <a:moveTo>
+                  <a:pt x="1228932" y="0"/>
+                </a:moveTo>
+                <a:cubicBezTo>
+                  <a:pt x="1907652" y="0"/>
+                  <a:pt x="2457864" y="550212"/>
+                  <a:pt x="2457864" y="1228932"/>
+                </a:cubicBezTo>
+                <a:cubicBezTo>
+                  <a:pt x="2457864" y="1907652"/>
+                  <a:pt x="1907652" y="2457864"/>
+                  <a:pt x="1228932" y="2457864"/>
+                </a:cubicBezTo>
+                <a:cubicBezTo>
+                  <a:pt x="550212" y="2457864"/>
+                  <a:pt x="0" y="1907652"/>
+                  <a:pt x="0" y="1228932"/>
+                </a:cubicBezTo>
+                <a:cubicBezTo>
+                  <a:pt x="0" y="550212"/>
+                  <a:pt x="550212" y="0"/>
+                  <a:pt x="1228932" y="0"/>
+                </a:cubicBezTo>
+                <a:close/>
+              </a:path>
+            </a:pathLst>
+          </a:custGeom>
+          <a:effectLst>
+            <a:outerShdw blurRad="50800" dist="38100" dir="2700000" algn="tl" rotWithShape="0">
+              <a:prstClr val="black">
+                <a:alpha val="40000"/>
+              </a:prstClr>
+            </a:outerShdw>
+          </a:effectLst>
+        </p:spPr>
+      </p:pic>
+      <p:sp>
+        <p:nvSpPr>
+          <p:cNvPr id="28" name="!!plus graphic">
+            <a:extLst>
+              <a:ext uri="{FF2B5EF4-FFF2-40B4-BE49-F238E27FC236}">
+                <a16:creationId xmlns:a16="http://schemas.microsoft.com/office/drawing/2014/main" id="{6CB927A4-E432-4310-9CD5-E89FF5063179}"/>
+              </a:ext>
+              <a:ext uri="{C183D7F6-B498-43B3-948B-1728B52AA6E4}">
+                <adec:decorative xmlns:adec="http://schemas.microsoft.com/office/drawing/2017/decorative" val="1"/>
+              </a:ext>
+            </a:extLst>
+          </p:cNvPr>
+          <p:cNvSpPr>
+            <a:spLocks noGrp="1" noRot="1" noChangeAspect="1" noMove="1" noResize="1" noEditPoints="1" noAdjustHandles="1" noChangeArrowheads="1" noChangeShapeType="1" noTextEdit="1"/>
+          </p:cNvSpPr>
+          <p:nvPr>
+            <p:extLst>
+              <p:ext uri="{386F3935-93C4-4BCD-93E2-E3B085C9AB24}">
+                <p16:designElem xmlns:p16="http://schemas.microsoft.com/office/powerpoint/2015/main" val="1"/>
+              </p:ext>
+            </p:extLst>
+          </p:nvPr>
+        </p:nvSpPr>
+        <p:spPr>
+          <a:xfrm>
+            <a:off x="10969280" y="1780012"/>
+            <a:ext cx="139039" cy="139039"/>
+          </a:xfrm>
+          <a:custGeom>
+            <a:avLst/>
+            <a:gdLst>
+              <a:gd name="connsiteX0" fmla="*/ 129602 w 139039"/>
+              <a:gd name="connsiteY0" fmla="*/ 60082 h 139039"/>
+              <a:gd name="connsiteX1" fmla="*/ 78957 w 139039"/>
+              <a:gd name="connsiteY1" fmla="*/ 60082 h 139039"/>
+              <a:gd name="connsiteX2" fmla="*/ 78957 w 139039"/>
+              <a:gd name="connsiteY2" fmla="*/ 9437 h 139039"/>
+              <a:gd name="connsiteX3" fmla="*/ 69520 w 139039"/>
+              <a:gd name="connsiteY3" fmla="*/ 0 h 139039"/>
+              <a:gd name="connsiteX4" fmla="*/ 60082 w 139039"/>
+              <a:gd name="connsiteY4" fmla="*/ 9437 h 139039"/>
+              <a:gd name="connsiteX5" fmla="*/ 60082 w 139039"/>
+              <a:gd name="connsiteY5" fmla="*/ 60082 h 139039"/>
+              <a:gd name="connsiteX6" fmla="*/ 9437 w 139039"/>
+              <a:gd name="connsiteY6" fmla="*/ 60082 h 139039"/>
+              <a:gd name="connsiteX7" fmla="*/ 0 w 139039"/>
+              <a:gd name="connsiteY7" fmla="*/ 69520 h 139039"/>
+              <a:gd name="connsiteX8" fmla="*/ 9437 w 139039"/>
+              <a:gd name="connsiteY8" fmla="*/ 78957 h 139039"/>
+              <a:gd name="connsiteX9" fmla="*/ 60082 w 139039"/>
+              <a:gd name="connsiteY9" fmla="*/ 78957 h 139039"/>
+              <a:gd name="connsiteX10" fmla="*/ 60082 w 139039"/>
+              <a:gd name="connsiteY10" fmla="*/ 129602 h 139039"/>
+              <a:gd name="connsiteX11" fmla="*/ 69520 w 139039"/>
+              <a:gd name="connsiteY11" fmla="*/ 139039 h 139039"/>
+              <a:gd name="connsiteX12" fmla="*/ 78957 w 139039"/>
+              <a:gd name="connsiteY12" fmla="*/ 129602 h 139039"/>
+              <a:gd name="connsiteX13" fmla="*/ 78957 w 139039"/>
+              <a:gd name="connsiteY13" fmla="*/ 78957 h 139039"/>
+              <a:gd name="connsiteX14" fmla="*/ 129602 w 139039"/>
+              <a:gd name="connsiteY14" fmla="*/ 78957 h 139039"/>
+              <a:gd name="connsiteX15" fmla="*/ 139039 w 139039"/>
+              <a:gd name="connsiteY15" fmla="*/ 69520 h 139039"/>
+              <a:gd name="connsiteX16" fmla="*/ 129602 w 139039"/>
+              <a:gd name="connsiteY16" fmla="*/ 60082 h 139039"/>
+            </a:gdLst>
+            <a:ahLst/>
+            <a:cxnLst>
+              <a:cxn ang="0">
+                <a:pos x="connsiteX0" y="connsiteY0"/>
+              </a:cxn>
+              <a:cxn ang="0">
+                <a:pos x="connsiteX1" y="connsiteY1"/>
+              </a:cxn>
+              <a:cxn ang="0">
+                <a:pos x="connsiteX2" y="connsiteY2"/>
+              </a:cxn>
+              <a:cxn ang="0">
+                <a:pos x="connsiteX3" y="connsiteY3"/>
+              </a:cxn>
+              <a:cxn ang="0">
+                <a:pos x="connsiteX4" y="connsiteY4"/>
+              </a:cxn>
+              <a:cxn ang="0">
+                <a:pos x="connsiteX5" y="connsiteY5"/>
+              </a:cxn>
+              <a:cxn ang="0">
+                <a:pos x="connsiteX6" y="connsiteY6"/>
+              </a:cxn>
+              <a:cxn ang="0">
+                <a:pos x="connsiteX7" y="connsiteY7"/>
+              </a:cxn>
+              <a:cxn ang="0">
+                <a:pos x="connsiteX8" y="connsiteY8"/>
+              </a:cxn>
+              <a:cxn ang="0">
+                <a:pos x="connsiteX9" y="connsiteY9"/>
+              </a:cxn>
+              <a:cxn ang="0">
+                <a:pos x="connsiteX10" y="connsiteY10"/>
+              </a:cxn>
+              <a:cxn ang="0">
+                <a:pos x="connsiteX11" y="connsiteY11"/>
+              </a:cxn>
+              <a:cxn ang="0">
+                <a:pos x="connsiteX12" y="connsiteY12"/>
+              </a:cxn>
+              <a:cxn ang="0">
+                <a:pos x="connsiteX13" y="connsiteY13"/>
+              </a:cxn>
+              <a:cxn ang="0">
+                <a:pos x="connsiteX14" y="connsiteY14"/>
+              </a:cxn>
+              <a:cxn ang="0">
+                <a:pos x="connsiteX15" y="connsiteY15"/>
+              </a:cxn>
+              <a:cxn ang="0">
+                <a:pos x="connsiteX16" y="connsiteY16"/>
+              </a:cxn>
+            </a:cxnLst>
+            <a:rect l="l" t="t" r="r" b="b"/>
+            <a:pathLst>
+              <a:path w="139039" h="139039">
+                <a:moveTo>
+                  <a:pt x="129602" y="60082"/>
+                </a:moveTo>
+                <a:lnTo>
+                  <a:pt x="78957" y="60082"/>
+                </a:lnTo>
+                <a:lnTo>
+                  <a:pt x="78957" y="9437"/>
+                </a:lnTo>
+                <a:cubicBezTo>
+                  <a:pt x="78957" y="4225"/>
+                  <a:pt x="74731" y="0"/>
+                  <a:pt x="69520" y="0"/>
+                </a:cubicBezTo>
+                <a:cubicBezTo>
+                  <a:pt x="64308" y="0"/>
+                  <a:pt x="60082" y="4225"/>
+                  <a:pt x="60082" y="9437"/>
+                </a:cubicBezTo>
+                <a:lnTo>
+                  <a:pt x="60082" y="60082"/>
+                </a:lnTo>
+                <a:lnTo>
+                  <a:pt x="9437" y="60082"/>
+                </a:lnTo>
+                <a:cubicBezTo>
+                  <a:pt x="4225" y="60082"/>
+                  <a:pt x="0" y="64308"/>
+                  <a:pt x="0" y="69520"/>
+                </a:cubicBezTo>
+                <a:cubicBezTo>
+                  <a:pt x="0" y="74731"/>
+                  <a:pt x="4225" y="78957"/>
+                  <a:pt x="9437" y="78957"/>
+                </a:cubicBezTo>
+                <a:lnTo>
+                  <a:pt x="60082" y="78957"/>
+                </a:lnTo>
+                <a:lnTo>
+                  <a:pt x="60082" y="129602"/>
+                </a:lnTo>
+                <a:cubicBezTo>
+                  <a:pt x="60082" y="134814"/>
+                  <a:pt x="64308" y="139039"/>
+                  <a:pt x="69520" y="139039"/>
+                </a:cubicBezTo>
+                <a:cubicBezTo>
+                  <a:pt x="74731" y="139039"/>
+                  <a:pt x="78957" y="134814"/>
+                  <a:pt x="78957" y="129602"/>
+                </a:cubicBezTo>
+                <a:lnTo>
+                  <a:pt x="78957" y="78957"/>
+                </a:lnTo>
+                <a:lnTo>
+                  <a:pt x="129602" y="78957"/>
+                </a:lnTo>
+                <a:cubicBezTo>
+                  <a:pt x="134814" y="78957"/>
+                  <a:pt x="139039" y="74731"/>
+                  <a:pt x="139039" y="69520"/>
+                </a:cubicBezTo>
+                <a:cubicBezTo>
+                  <a:pt x="139039" y="64308"/>
+                  <a:pt x="134814" y="60082"/>
+                  <a:pt x="129602" y="60082"/>
+                </a:cubicBezTo>
+                <a:close/>
+              </a:path>
+            </a:pathLst>
+          </a:custGeom>
+          <a:solidFill>
+            <a:schemeClr val="accent2"/>
+          </a:solidFill>
+          <a:ln w="603" cap="flat">
+            <a:noFill/>
+            <a:prstDash val="solid"/>
+            <a:miter/>
+          </a:ln>
+        </p:spPr>
+        <p:txBody>
+          <a:bodyPr rtlCol="0" anchor="ctr"/>
+          <a:lstStyle/>
+          <a:p>
+            <a:endParaRPr lang="en-US"/>
+          </a:p>
+        </p:txBody>
+      </p:sp>
+      <p:sp>
+        <p:nvSpPr>
+          <p:cNvPr id="29" name="!!dot graphic">
+            <a:extLst>
+              <a:ext uri="{FF2B5EF4-FFF2-40B4-BE49-F238E27FC236}">
+                <a16:creationId xmlns:a16="http://schemas.microsoft.com/office/drawing/2014/main" id="{E3020543-B24B-4EC4-8FFC-8DD88EEA91A8}"/>
+              </a:ext>
+              <a:ext uri="{C183D7F6-B498-43B3-948B-1728B52AA6E4}">
+                <adec:decorative xmlns:adec="http://schemas.microsoft.com/office/drawing/2017/decorative" val="1"/>
+              </a:ext>
+            </a:extLst>
+          </p:cNvPr>
+          <p:cNvSpPr>
+            <a:spLocks noGrp="1" noRot="1" noChangeAspect="1" noMove="1" noResize="1" noEditPoints="1" noAdjustHandles="1" noChangeArrowheads="1" noChangeShapeType="1" noTextEdit="1"/>
+          </p:cNvSpPr>
+          <p:nvPr>
+            <p:extLst>
+              <p:ext uri="{386F3935-93C4-4BCD-93E2-E3B085C9AB24}">
+                <p16:designElem xmlns:p16="http://schemas.microsoft.com/office/powerpoint/2015/main" val="1"/>
+              </p:ext>
+            </p:extLst>
+          </p:nvPr>
+        </p:nvSpPr>
+        <p:spPr>
+          <a:xfrm>
+            <a:off x="11281590" y="2070656"/>
+            <a:ext cx="91138" cy="91138"/>
+          </a:xfrm>
+          <a:custGeom>
+            <a:avLst/>
+            <a:gdLst>
+              <a:gd name="connsiteX0" fmla="*/ 91138 w 91138"/>
+              <a:gd name="connsiteY0" fmla="*/ 45569 h 91138"/>
+              <a:gd name="connsiteX1" fmla="*/ 45569 w 91138"/>
+              <a:gd name="connsiteY1" fmla="*/ 91138 h 91138"/>
+              <a:gd name="connsiteX2" fmla="*/ 0 w 91138"/>
+              <a:gd name="connsiteY2" fmla="*/ 45569 h 91138"/>
+              <a:gd name="connsiteX3" fmla="*/ 45569 w 91138"/>
+              <a:gd name="connsiteY3" fmla="*/ 0 h 91138"/>
+              <a:gd name="connsiteX4" fmla="*/ 91138 w 91138"/>
+              <a:gd name="connsiteY4" fmla="*/ 45569 h 91138"/>
+            </a:gdLst>
+            <a:ahLst/>
+            <a:cxnLst>
+              <a:cxn ang="0">
+                <a:pos x="connsiteX0" y="connsiteY0"/>
+              </a:cxn>
+              <a:cxn ang="0">
+                <a:pos x="connsiteX1" y="connsiteY1"/>
+              </a:cxn>
+              <a:cxn ang="0">
+                <a:pos x="connsiteX2" y="connsiteY2"/>
+              </a:cxn>
+              <a:cxn ang="0">
+                <a:pos x="connsiteX3" y="connsiteY3"/>
+              </a:cxn>
+              <a:cxn ang="0">
+                <a:pos x="connsiteX4" y="connsiteY4"/>
+              </a:cxn>
+            </a:cxnLst>
+            <a:rect l="l" t="t" r="r" b="b"/>
+            <a:pathLst>
+              <a:path w="91138" h="91138">
+                <a:moveTo>
+                  <a:pt x="91138" y="45569"/>
+                </a:moveTo>
+                <a:cubicBezTo>
+                  <a:pt x="91138" y="70736"/>
+                  <a:pt x="70736" y="91138"/>
+                  <a:pt x="45569" y="91138"/>
+                </a:cubicBezTo>
+                <a:cubicBezTo>
+                  <a:pt x="20402" y="91138"/>
+                  <a:pt x="0" y="70736"/>
+                  <a:pt x="0" y="45569"/>
+                </a:cubicBezTo>
+                <a:cubicBezTo>
+                  <a:pt x="0" y="20402"/>
+                  <a:pt x="20402" y="0"/>
+                  <a:pt x="45569" y="0"/>
+                </a:cubicBezTo>
+                <a:cubicBezTo>
+                  <a:pt x="70736" y="0"/>
+                  <a:pt x="91138" y="20402"/>
+                  <a:pt x="91138" y="45569"/>
+                </a:cubicBezTo>
+                <a:close/>
+              </a:path>
+            </a:pathLst>
+          </a:custGeom>
+          <a:solidFill>
+            <a:schemeClr val="accent2"/>
+          </a:solidFill>
+          <a:ln w="422" cap="flat">
+            <a:noFill/>
+            <a:prstDash val="solid"/>
+            <a:miter/>
+          </a:ln>
+        </p:spPr>
+        <p:txBody>
+          <a:bodyPr rtlCol="0" anchor="ctr"/>
+          <a:lstStyle/>
+          <a:p>
+            <a:endParaRPr lang="en-US"/>
+          </a:p>
+        </p:txBody>
+      </p:sp>
+    </p:spTree>
+    <p:extLst>
+      <p:ext uri="{BB962C8B-B14F-4D97-AF65-F5344CB8AC3E}">
+        <p14:creationId xmlns:p14="http://schemas.microsoft.com/office/powerpoint/2010/main" val="215021640"/>
+      </p:ext>
+    </p:extLst>
+  </p:cSld>
+  <p:clrMapOvr>
+    <a:masterClrMapping/>
+  </p:clrMapOvr>
+</p:sld>
+</file>
+
+<file path=ppt/slides/slide5.xml><?xml version="1.0" encoding="utf-8"?>
+<p:sld xmlns:a="http://schemas.openxmlformats.org/drawingml/2006/main" xmlns:r="http://schemas.openxmlformats.org/officeDocument/2006/relationships" xmlns:p="http://schemas.openxmlformats.org/presentationml/2006/main">
+  <p:cSld>
+    <p:spTree>
+      <p:nvGrpSpPr>
+        <p:cNvPr id="1" name=""/>
+        <p:cNvGrpSpPr/>
+        <p:nvPr/>
+      </p:nvGrpSpPr>
+      <p:grpSpPr>
+        <a:xfrm>
+          <a:off x="0" y="0"/>
+          <a:ext cx="0" cy="0"/>
+          <a:chOff x="0" y="0"/>
+          <a:chExt cx="0" cy="0"/>
+        </a:xfrm>
+      </p:grpSpPr>
+      <p:sp>
+        <p:nvSpPr>
+          <p:cNvPr id="2" name="Title 1">
+            <a:extLst>
+              <a:ext uri="{FF2B5EF4-FFF2-40B4-BE49-F238E27FC236}">
+                <a16:creationId xmlns:a16="http://schemas.microsoft.com/office/drawing/2014/main" id="{D1203BF2-AF9D-4C8C-8A11-A7A37D5A125F}"/>
+              </a:ext>
+            </a:extLst>
+          </p:cNvPr>
+          <p:cNvSpPr>
+            <a:spLocks noGrp="1"/>
+          </p:cNvSpPr>
+          <p:nvPr>
+            <p:ph type="title"/>
+          </p:nvPr>
+        </p:nvSpPr>
+        <p:spPr/>
+        <p:txBody>
+          <a:bodyPr/>
+          <a:lstStyle/>
+          <a:p>
+            <a:r>
+              <a:rPr lang="en-GB" cap="none"/>
+              <a:t>Bootstrap Extras</a:t>
+            </a:r>
+            <a:endParaRPr lang="en-US" cap="none"/>
+          </a:p>
+        </p:txBody>
+      </p:sp>
+      <p:sp>
+        <p:nvSpPr>
+          <p:cNvPr id="3" name="Content Placeholder 2">
+            <a:extLst>
+              <a:ext uri="{FF2B5EF4-FFF2-40B4-BE49-F238E27FC236}">
+                <a16:creationId xmlns:a16="http://schemas.microsoft.com/office/drawing/2014/main" id="{D2E39567-623B-407C-9B8A-E85D3475D67F}"/>
+              </a:ext>
+            </a:extLst>
+          </p:cNvPr>
+          <p:cNvSpPr>
+            <a:spLocks noGrp="1"/>
+          </p:cNvSpPr>
+          <p:nvPr>
+            <p:ph idx="1"/>
+          </p:nvPr>
+        </p:nvSpPr>
+        <p:spPr>
+          <a:xfrm>
+            <a:off x="576072" y="1825625"/>
+            <a:ext cx="4380241" cy="4351338"/>
+          </a:xfrm>
+        </p:spPr>
+        <p:txBody>
+          <a:bodyPr/>
+          <a:lstStyle/>
+          <a:p>
+            <a:r>
+              <a:rPr lang="en-GB"/>
+              <a:t>popovers</a:t>
+            </a:r>
+          </a:p>
+          <a:p>
+            <a:endParaRPr lang="en-GB"/>
+          </a:p>
+          <a:p>
+            <a:endParaRPr lang="en-GB"/>
+          </a:p>
+          <a:p>
+            <a:r>
+              <a:rPr lang="en-GB"/>
+              <a:t>accordion</a:t>
+            </a:r>
+            <a:endParaRPr lang="en-US"/>
+          </a:p>
+        </p:txBody>
+      </p:sp>
+      <p:pic>
+        <p:nvPicPr>
+          <p:cNvPr id="10" name="Picture 9" descr="Graphical user interface, text, application&#10;&#10;Description automatically generated">
+            <a:extLst>
+              <a:ext uri="{FF2B5EF4-FFF2-40B4-BE49-F238E27FC236}">
+                <a16:creationId xmlns:a16="http://schemas.microsoft.com/office/drawing/2014/main" id="{7A0E6CFB-3EDF-4DF1-AE16-75BCB2872138}"/>
+              </a:ext>
+            </a:extLst>
+          </p:cNvPr>
+          <p:cNvPicPr>
+            <a:picLocks noChangeAspect="1"/>
+          </p:cNvPicPr>
+          <p:nvPr/>
+        </p:nvPicPr>
+        <p:blipFill>
+          <a:blip r:embed="rId2"/>
+          <a:stretch>
+            <a:fillRect/>
+          </a:stretch>
+        </p:blipFill>
+        <p:spPr>
+          <a:xfrm>
+            <a:off x="3146563" y="1825625"/>
+            <a:ext cx="3798687" cy="1129610"/>
+          </a:xfrm>
+          <a:custGeom>
+            <a:avLst/>
+            <a:gdLst>
+              <a:gd name="connsiteX0" fmla="*/ 0 w 3798687"/>
+              <a:gd name="connsiteY0" fmla="*/ 0 h 1129610"/>
+              <a:gd name="connsiteX1" fmla="*/ 633115 w 3798687"/>
+              <a:gd name="connsiteY1" fmla="*/ 0 h 1129610"/>
+              <a:gd name="connsiteX2" fmla="*/ 1304216 w 3798687"/>
+              <a:gd name="connsiteY2" fmla="*/ 0 h 1129610"/>
+              <a:gd name="connsiteX3" fmla="*/ 2013304 w 3798687"/>
+              <a:gd name="connsiteY3" fmla="*/ 0 h 1129610"/>
+              <a:gd name="connsiteX4" fmla="*/ 2684405 w 3798687"/>
+              <a:gd name="connsiteY4" fmla="*/ 0 h 1129610"/>
+              <a:gd name="connsiteX5" fmla="*/ 3203559 w 3798687"/>
+              <a:gd name="connsiteY5" fmla="*/ 0 h 1129610"/>
+              <a:gd name="connsiteX6" fmla="*/ 3798687 w 3798687"/>
+              <a:gd name="connsiteY6" fmla="*/ 0 h 1129610"/>
+              <a:gd name="connsiteX7" fmla="*/ 3798687 w 3798687"/>
+              <a:gd name="connsiteY7" fmla="*/ 530917 h 1129610"/>
+              <a:gd name="connsiteX8" fmla="*/ 3798687 w 3798687"/>
+              <a:gd name="connsiteY8" fmla="*/ 1129610 h 1129610"/>
+              <a:gd name="connsiteX9" fmla="*/ 3165573 w 3798687"/>
+              <a:gd name="connsiteY9" fmla="*/ 1129610 h 1129610"/>
+              <a:gd name="connsiteX10" fmla="*/ 2608432 w 3798687"/>
+              <a:gd name="connsiteY10" fmla="*/ 1129610 h 1129610"/>
+              <a:gd name="connsiteX11" fmla="*/ 2089278 w 3798687"/>
+              <a:gd name="connsiteY11" fmla="*/ 1129610 h 1129610"/>
+              <a:gd name="connsiteX12" fmla="*/ 1456163 w 3798687"/>
+              <a:gd name="connsiteY12" fmla="*/ 1129610 h 1129610"/>
+              <a:gd name="connsiteX13" fmla="*/ 747075 w 3798687"/>
+              <a:gd name="connsiteY13" fmla="*/ 1129610 h 1129610"/>
+              <a:gd name="connsiteX14" fmla="*/ 0 w 3798687"/>
+              <a:gd name="connsiteY14" fmla="*/ 1129610 h 1129610"/>
+              <a:gd name="connsiteX15" fmla="*/ 0 w 3798687"/>
+              <a:gd name="connsiteY15" fmla="*/ 587397 h 1129610"/>
+              <a:gd name="connsiteX16" fmla="*/ 0 w 3798687"/>
+              <a:gd name="connsiteY16" fmla="*/ 0 h 1129610"/>
+            </a:gdLst>
+            <a:ahLst/>
+            <a:cxnLst>
+              <a:cxn ang="0">
+                <a:pos x="connsiteX0" y="connsiteY0"/>
+              </a:cxn>
+              <a:cxn ang="0">
+                <a:pos x="connsiteX1" y="connsiteY1"/>
+              </a:cxn>
+              <a:cxn ang="0">
+                <a:pos x="connsiteX2" y="connsiteY2"/>
+              </a:cxn>
+              <a:cxn ang="0">
+                <a:pos x="connsiteX3" y="connsiteY3"/>
+              </a:cxn>
+              <a:cxn ang="0">
+                <a:pos x="connsiteX4" y="connsiteY4"/>
+              </a:cxn>
+              <a:cxn ang="0">
+                <a:pos x="connsiteX5" y="connsiteY5"/>
+              </a:cxn>
+              <a:cxn ang="0">
+                <a:pos x="connsiteX6" y="connsiteY6"/>
+              </a:cxn>
+              <a:cxn ang="0">
+                <a:pos x="connsiteX7" y="connsiteY7"/>
+              </a:cxn>
+              <a:cxn ang="0">
+                <a:pos x="connsiteX8" y="connsiteY8"/>
+              </a:cxn>
+              <a:cxn ang="0">
+                <a:pos x="connsiteX9" y="connsiteY9"/>
+              </a:cxn>
+              <a:cxn ang="0">
+                <a:pos x="connsiteX10" y="connsiteY10"/>
+              </a:cxn>
+              <a:cxn ang="0">
+                <a:pos x="connsiteX11" y="connsiteY11"/>
+              </a:cxn>
+              <a:cxn ang="0">
+                <a:pos x="connsiteX12" y="connsiteY12"/>
+              </a:cxn>
+              <a:cxn ang="0">
+                <a:pos x="connsiteX13" y="connsiteY13"/>
+              </a:cxn>
+              <a:cxn ang="0">
+                <a:pos x="connsiteX14" y="connsiteY14"/>
+              </a:cxn>
+              <a:cxn ang="0">
+                <a:pos x="connsiteX15" y="connsiteY15"/>
+              </a:cxn>
+              <a:cxn ang="0">
+                <a:pos x="connsiteX16" y="connsiteY16"/>
+              </a:cxn>
+            </a:cxnLst>
+            <a:rect l="l" t="t" r="r" b="b"/>
+            <a:pathLst>
+              <a:path w="3798687" h="1129610" fill="none" extrusionOk="0">
+                <a:moveTo>
+                  <a:pt x="0" y="0"/>
+                </a:moveTo>
+                <a:cubicBezTo>
+                  <a:pt x="254864" y="-28773"/>
+                  <a:pt x="416107" y="2118"/>
+                  <a:pt x="633115" y="0"/>
+                </a:cubicBezTo>
+                <a:cubicBezTo>
+                  <a:pt x="850123" y="-2118"/>
+                  <a:pt x="1145007" y="11895"/>
+                  <a:pt x="1304216" y="0"/>
+                </a:cubicBezTo>
+                <a:cubicBezTo>
+                  <a:pt x="1463425" y="-11895"/>
+                  <a:pt x="1727070" y="11675"/>
+                  <a:pt x="2013304" y="0"/>
+                </a:cubicBezTo>
+                <a:cubicBezTo>
+                  <a:pt x="2299538" y="-11675"/>
+                  <a:pt x="2515243" y="-857"/>
+                  <a:pt x="2684405" y="0"/>
+                </a:cubicBezTo>
+                <a:cubicBezTo>
+                  <a:pt x="2853567" y="857"/>
+                  <a:pt x="2948076" y="-12487"/>
+                  <a:pt x="3203559" y="0"/>
+                </a:cubicBezTo>
+                <a:cubicBezTo>
+                  <a:pt x="3459042" y="12487"/>
+                  <a:pt x="3654495" y="-1410"/>
+                  <a:pt x="3798687" y="0"/>
+                </a:cubicBezTo>
+                <a:cubicBezTo>
+                  <a:pt x="3778345" y="181378"/>
+                  <a:pt x="3790000" y="322678"/>
+                  <a:pt x="3798687" y="530917"/>
+                </a:cubicBezTo>
+                <a:cubicBezTo>
+                  <a:pt x="3807374" y="739156"/>
+                  <a:pt x="3785905" y="885810"/>
+                  <a:pt x="3798687" y="1129610"/>
+                </a:cubicBezTo>
+                <a:cubicBezTo>
+                  <a:pt x="3657696" y="1122010"/>
+                  <a:pt x="3350560" y="1154366"/>
+                  <a:pt x="3165573" y="1129610"/>
+                </a:cubicBezTo>
+                <a:cubicBezTo>
+                  <a:pt x="2980586" y="1104854"/>
+                  <a:pt x="2742737" y="1128840"/>
+                  <a:pt x="2608432" y="1129610"/>
+                </a:cubicBezTo>
+                <a:cubicBezTo>
+                  <a:pt x="2474127" y="1130380"/>
+                  <a:pt x="2340780" y="1119997"/>
+                  <a:pt x="2089278" y="1129610"/>
+                </a:cubicBezTo>
+                <a:cubicBezTo>
+                  <a:pt x="1837776" y="1139223"/>
+                  <a:pt x="1642813" y="1131150"/>
+                  <a:pt x="1456163" y="1129610"/>
+                </a:cubicBezTo>
+                <a:cubicBezTo>
+                  <a:pt x="1269514" y="1128070"/>
+                  <a:pt x="1055718" y="1150685"/>
+                  <a:pt x="747075" y="1129610"/>
+                </a:cubicBezTo>
+                <a:cubicBezTo>
+                  <a:pt x="438432" y="1108535"/>
+                  <a:pt x="299426" y="1158910"/>
+                  <a:pt x="0" y="1129610"/>
+                </a:cubicBezTo>
+                <a:cubicBezTo>
+                  <a:pt x="1668" y="977152"/>
+                  <a:pt x="-15023" y="833049"/>
+                  <a:pt x="0" y="587397"/>
+                </a:cubicBezTo>
+                <a:cubicBezTo>
+                  <a:pt x="15023" y="341745"/>
+                  <a:pt x="-8017" y="150891"/>
+                  <a:pt x="0" y="0"/>
+                </a:cubicBezTo>
+                <a:close/>
+              </a:path>
+              <a:path w="3798687" h="1129610" stroke="0" extrusionOk="0">
+                <a:moveTo>
+                  <a:pt x="0" y="0"/>
+                </a:moveTo>
+                <a:cubicBezTo>
+                  <a:pt x="215378" y="-24400"/>
+                  <a:pt x="495241" y="-16208"/>
+                  <a:pt x="671101" y="0"/>
+                </a:cubicBezTo>
+                <a:cubicBezTo>
+                  <a:pt x="846961" y="16208"/>
+                  <a:pt x="1090768" y="14251"/>
+                  <a:pt x="1342203" y="0"/>
+                </a:cubicBezTo>
+                <a:cubicBezTo>
+                  <a:pt x="1593638" y="-14251"/>
+                  <a:pt x="1832270" y="-23270"/>
+                  <a:pt x="1975317" y="0"/>
+                </a:cubicBezTo>
+                <a:cubicBezTo>
+                  <a:pt x="2118364" y="23270"/>
+                  <a:pt x="2273197" y="-21654"/>
+                  <a:pt x="2494471" y="0"/>
+                </a:cubicBezTo>
+                <a:cubicBezTo>
+                  <a:pt x="2715745" y="21654"/>
+                  <a:pt x="2956002" y="18792"/>
+                  <a:pt x="3165573" y="0"/>
+                </a:cubicBezTo>
+                <a:cubicBezTo>
+                  <a:pt x="3375144" y="-18792"/>
+                  <a:pt x="3647908" y="-27530"/>
+                  <a:pt x="3798687" y="0"/>
+                </a:cubicBezTo>
+                <a:cubicBezTo>
+                  <a:pt x="3774864" y="142226"/>
+                  <a:pt x="3807730" y="315441"/>
+                  <a:pt x="3798687" y="587397"/>
+                </a:cubicBezTo>
+                <a:cubicBezTo>
+                  <a:pt x="3789644" y="859353"/>
+                  <a:pt x="3822269" y="997722"/>
+                  <a:pt x="3798687" y="1129610"/>
+                </a:cubicBezTo>
+                <a:cubicBezTo>
+                  <a:pt x="3537748" y="1146419"/>
+                  <a:pt x="3398840" y="1137238"/>
+                  <a:pt x="3241546" y="1129610"/>
+                </a:cubicBezTo>
+                <a:cubicBezTo>
+                  <a:pt x="3084252" y="1121982"/>
+                  <a:pt x="2829575" y="1124462"/>
+                  <a:pt x="2684405" y="1129610"/>
+                </a:cubicBezTo>
+                <a:cubicBezTo>
+                  <a:pt x="2539235" y="1134758"/>
+                  <a:pt x="2251761" y="1127940"/>
+                  <a:pt x="2051291" y="1129610"/>
+                </a:cubicBezTo>
+                <a:cubicBezTo>
+                  <a:pt x="1850821" y="1131280"/>
+                  <a:pt x="1619680" y="1125876"/>
+                  <a:pt x="1380190" y="1129610"/>
+                </a:cubicBezTo>
+                <a:cubicBezTo>
+                  <a:pt x="1140700" y="1133344"/>
+                  <a:pt x="1000613" y="1135426"/>
+                  <a:pt x="709088" y="1129610"/>
+                </a:cubicBezTo>
+                <a:cubicBezTo>
+                  <a:pt x="417563" y="1123794"/>
+                  <a:pt x="195597" y="1161469"/>
+                  <a:pt x="0" y="1129610"/>
+                </a:cubicBezTo>
+                <a:cubicBezTo>
+                  <a:pt x="22654" y="967577"/>
+                  <a:pt x="-18538" y="758031"/>
+                  <a:pt x="0" y="587397"/>
+                </a:cubicBezTo>
+                <a:cubicBezTo>
+                  <a:pt x="18538" y="416763"/>
+                  <a:pt x="-2242" y="215550"/>
+                  <a:pt x="0" y="0"/>
+                </a:cubicBezTo>
+                <a:close/>
+              </a:path>
+            </a:pathLst>
+          </a:custGeom>
+          <a:ln>
+            <a:solidFill>
+              <a:schemeClr val="tx1"/>
+            </a:solidFill>
+            <a:extLst>
+              <a:ext uri="{C807C97D-BFC1-408E-A445-0C87EB9F89A2}">
+                <ask:lineSketchStyleProps xmlns:ask="http://schemas.microsoft.com/office/drawing/2018/sketchyshapes" sd="3108242190">
+                  <a:prstGeom prst="rect">
+                    <a:avLst/>
+                  </a:prstGeom>
+                  <ask:type>
+                    <ask:lineSketchFreehand/>
+                  </ask:type>
+                </ask:lineSketchStyleProps>
+              </a:ext>
+            </a:extLst>
+          </a:ln>
+        </p:spPr>
+      </p:pic>
+      <p:pic>
+        <p:nvPicPr>
+          <p:cNvPr id="12" name="Picture 11" descr="Graphical user interface, application&#10;&#10;Description automatically generated with medium confidence">
+            <a:extLst>
+              <a:ext uri="{FF2B5EF4-FFF2-40B4-BE49-F238E27FC236}">
+                <a16:creationId xmlns:a16="http://schemas.microsoft.com/office/drawing/2014/main" id="{94DB57ED-F008-43B0-8E50-E2021B6EC5F3}"/>
+              </a:ext>
+            </a:extLst>
+          </p:cNvPr>
+          <p:cNvPicPr>
+            <a:picLocks noChangeAspect="1"/>
+          </p:cNvPicPr>
+          <p:nvPr/>
+        </p:nvPicPr>
+        <p:blipFill>
+          <a:blip r:embed="rId3"/>
+          <a:stretch>
+            <a:fillRect/>
+          </a:stretch>
+        </p:blipFill>
+        <p:spPr>
+          <a:xfrm>
+            <a:off x="3084789" y="3429001"/>
+            <a:ext cx="4828069" cy="723208"/>
+          </a:xfrm>
+          <a:custGeom>
+            <a:avLst/>
+            <a:gdLst>
+              <a:gd name="connsiteX0" fmla="*/ 0 w 4828069"/>
+              <a:gd name="connsiteY0" fmla="*/ 0 h 723208"/>
+              <a:gd name="connsiteX1" fmla="*/ 544882 w 4828069"/>
+              <a:gd name="connsiteY1" fmla="*/ 0 h 723208"/>
+              <a:gd name="connsiteX2" fmla="*/ 1089764 w 4828069"/>
+              <a:gd name="connsiteY2" fmla="*/ 0 h 723208"/>
+              <a:gd name="connsiteX3" fmla="*/ 1682927 w 4828069"/>
+              <a:gd name="connsiteY3" fmla="*/ 0 h 723208"/>
+              <a:gd name="connsiteX4" fmla="*/ 2276090 w 4828069"/>
+              <a:gd name="connsiteY4" fmla="*/ 0 h 723208"/>
+              <a:gd name="connsiteX5" fmla="*/ 2965814 w 4828069"/>
+              <a:gd name="connsiteY5" fmla="*/ 0 h 723208"/>
+              <a:gd name="connsiteX6" fmla="*/ 3703819 w 4828069"/>
+              <a:gd name="connsiteY6" fmla="*/ 0 h 723208"/>
+              <a:gd name="connsiteX7" fmla="*/ 4828069 w 4828069"/>
+              <a:gd name="connsiteY7" fmla="*/ 0 h 723208"/>
+              <a:gd name="connsiteX8" fmla="*/ 4828069 w 4828069"/>
+              <a:gd name="connsiteY8" fmla="*/ 347140 h 723208"/>
+              <a:gd name="connsiteX9" fmla="*/ 4828069 w 4828069"/>
+              <a:gd name="connsiteY9" fmla="*/ 723208 h 723208"/>
+              <a:gd name="connsiteX10" fmla="*/ 4186626 w 4828069"/>
+              <a:gd name="connsiteY10" fmla="*/ 723208 h 723208"/>
+              <a:gd name="connsiteX11" fmla="*/ 3400340 w 4828069"/>
+              <a:gd name="connsiteY11" fmla="*/ 723208 h 723208"/>
+              <a:gd name="connsiteX12" fmla="*/ 2614055 w 4828069"/>
+              <a:gd name="connsiteY12" fmla="*/ 723208 h 723208"/>
+              <a:gd name="connsiteX13" fmla="*/ 2069172 w 4828069"/>
+              <a:gd name="connsiteY13" fmla="*/ 723208 h 723208"/>
+              <a:gd name="connsiteX14" fmla="*/ 1379448 w 4828069"/>
+              <a:gd name="connsiteY14" fmla="*/ 723208 h 723208"/>
+              <a:gd name="connsiteX15" fmla="*/ 593163 w 4828069"/>
+              <a:gd name="connsiteY15" fmla="*/ 723208 h 723208"/>
+              <a:gd name="connsiteX16" fmla="*/ 0 w 4828069"/>
+              <a:gd name="connsiteY16" fmla="*/ 723208 h 723208"/>
+              <a:gd name="connsiteX17" fmla="*/ 0 w 4828069"/>
+              <a:gd name="connsiteY17" fmla="*/ 361604 h 723208"/>
+              <a:gd name="connsiteX18" fmla="*/ 0 w 4828069"/>
+              <a:gd name="connsiteY18" fmla="*/ 0 h 723208"/>
+            </a:gdLst>
+            <a:ahLst/>
+            <a:cxnLst>
+              <a:cxn ang="0">
+                <a:pos x="connsiteX0" y="connsiteY0"/>
+              </a:cxn>
+              <a:cxn ang="0">
+                <a:pos x="connsiteX1" y="connsiteY1"/>
+              </a:cxn>
+              <a:cxn ang="0">
+                <a:pos x="connsiteX2" y="connsiteY2"/>
+              </a:cxn>
+              <a:cxn ang="0">
+                <a:pos x="connsiteX3" y="connsiteY3"/>
+              </a:cxn>
+              <a:cxn ang="0">
+                <a:pos x="connsiteX4" y="connsiteY4"/>
+              </a:cxn>
+              <a:cxn ang="0">
+                <a:pos x="connsiteX5" y="connsiteY5"/>
+              </a:cxn>
+              <a:cxn ang="0">
+                <a:pos x="connsiteX6" y="connsiteY6"/>
+              </a:cxn>
+              <a:cxn ang="0">
+                <a:pos x="connsiteX7" y="connsiteY7"/>
+              </a:cxn>
+              <a:cxn ang="0">
+                <a:pos x="connsiteX8" y="connsiteY8"/>
+              </a:cxn>
+              <a:cxn ang="0">
+                <a:pos x="connsiteX9" y="connsiteY9"/>
+              </a:cxn>
+              <a:cxn ang="0">
+                <a:pos x="connsiteX10" y="connsiteY10"/>
+              </a:cxn>
+              <a:cxn ang="0">
+                <a:pos x="connsiteX11" y="connsiteY11"/>
+              </a:cxn>
+              <a:cxn ang="0">
+                <a:pos x="connsiteX12" y="connsiteY12"/>
+              </a:cxn>
+              <a:cxn ang="0">
+                <a:pos x="connsiteX13" y="connsiteY13"/>
+              </a:cxn>
+              <a:cxn ang="0">
+                <a:pos x="connsiteX14" y="connsiteY14"/>
+              </a:cxn>
+              <a:cxn ang="0">
+                <a:pos x="connsiteX15" y="connsiteY15"/>
+              </a:cxn>
+              <a:cxn ang="0">
+                <a:pos x="connsiteX16" y="connsiteY16"/>
+              </a:cxn>
+              <a:cxn ang="0">
+                <a:pos x="connsiteX17" y="connsiteY17"/>
+              </a:cxn>
+              <a:cxn ang="0">
+                <a:pos x="connsiteX18" y="connsiteY18"/>
+              </a:cxn>
+            </a:cxnLst>
+            <a:rect l="l" t="t" r="r" b="b"/>
+            <a:pathLst>
+              <a:path w="4828069" h="723208" fill="none" extrusionOk="0">
+                <a:moveTo>
+                  <a:pt x="0" y="0"/>
+                </a:moveTo>
+                <a:cubicBezTo>
+                  <a:pt x="220642" y="8007"/>
+                  <a:pt x="390333" y="-3691"/>
+                  <a:pt x="544882" y="0"/>
+                </a:cubicBezTo>
+                <a:cubicBezTo>
+                  <a:pt x="699431" y="3691"/>
+                  <a:pt x="834431" y="7580"/>
+                  <a:pt x="1089764" y="0"/>
+                </a:cubicBezTo>
+                <a:cubicBezTo>
+                  <a:pt x="1345097" y="-7580"/>
+                  <a:pt x="1544034" y="-28543"/>
+                  <a:pt x="1682927" y="0"/>
+                </a:cubicBezTo>
+                <a:cubicBezTo>
+                  <a:pt x="1821820" y="28543"/>
+                  <a:pt x="2120085" y="-3604"/>
+                  <a:pt x="2276090" y="0"/>
+                </a:cubicBezTo>
+                <a:cubicBezTo>
+                  <a:pt x="2432095" y="3604"/>
+                  <a:pt x="2676177" y="28218"/>
+                  <a:pt x="2965814" y="0"/>
+                </a:cubicBezTo>
+                <a:cubicBezTo>
+                  <a:pt x="3255451" y="-28218"/>
+                  <a:pt x="3440664" y="9408"/>
+                  <a:pt x="3703819" y="0"/>
+                </a:cubicBezTo>
+                <a:cubicBezTo>
+                  <a:pt x="3966975" y="-9408"/>
+                  <a:pt x="4500831" y="-40318"/>
+                  <a:pt x="4828069" y="0"/>
+                </a:cubicBezTo>
+                <a:cubicBezTo>
+                  <a:pt x="4832716" y="128033"/>
+                  <a:pt x="4817971" y="227199"/>
+                  <a:pt x="4828069" y="347140"/>
+                </a:cubicBezTo>
+                <a:cubicBezTo>
+                  <a:pt x="4838167" y="467081"/>
+                  <a:pt x="4810267" y="647959"/>
+                  <a:pt x="4828069" y="723208"/>
+                </a:cubicBezTo>
+                <a:cubicBezTo>
+                  <a:pt x="4540475" y="697073"/>
+                  <a:pt x="4462165" y="720195"/>
+                  <a:pt x="4186626" y="723208"/>
+                </a:cubicBezTo>
+                <a:cubicBezTo>
+                  <a:pt x="3911087" y="726221"/>
+                  <a:pt x="3642736" y="730990"/>
+                  <a:pt x="3400340" y="723208"/>
+                </a:cubicBezTo>
+                <a:cubicBezTo>
+                  <a:pt x="3157944" y="715426"/>
+                  <a:pt x="2828220" y="759072"/>
+                  <a:pt x="2614055" y="723208"/>
+                </a:cubicBezTo>
+                <a:cubicBezTo>
+                  <a:pt x="2399890" y="687344"/>
+                  <a:pt x="2185011" y="695997"/>
+                  <a:pt x="2069172" y="723208"/>
+                </a:cubicBezTo>
+                <a:cubicBezTo>
+                  <a:pt x="1953333" y="750419"/>
+                  <a:pt x="1679703" y="746203"/>
+                  <a:pt x="1379448" y="723208"/>
+                </a:cubicBezTo>
+                <a:cubicBezTo>
+                  <a:pt x="1079193" y="700213"/>
+                  <a:pt x="874417" y="708737"/>
+                  <a:pt x="593163" y="723208"/>
+                </a:cubicBezTo>
+                <a:cubicBezTo>
+                  <a:pt x="311909" y="737679"/>
+                  <a:pt x="214107" y="730870"/>
+                  <a:pt x="0" y="723208"/>
+                </a:cubicBezTo>
+                <a:cubicBezTo>
+                  <a:pt x="9439" y="580635"/>
+                  <a:pt x="13784" y="508753"/>
+                  <a:pt x="0" y="361604"/>
+                </a:cubicBezTo>
+                <a:cubicBezTo>
+                  <a:pt x="-13784" y="214455"/>
+                  <a:pt x="8531" y="139204"/>
+                  <a:pt x="0" y="0"/>
+                </a:cubicBezTo>
+                <a:close/>
+              </a:path>
+              <a:path w="4828069" h="723208" stroke="0" extrusionOk="0">
+                <a:moveTo>
+                  <a:pt x="0" y="0"/>
+                </a:moveTo>
+                <a:cubicBezTo>
+                  <a:pt x="186318" y="21350"/>
+                  <a:pt x="361113" y="1516"/>
+                  <a:pt x="544882" y="0"/>
+                </a:cubicBezTo>
+                <a:cubicBezTo>
+                  <a:pt x="728651" y="-1516"/>
+                  <a:pt x="967805" y="-17157"/>
+                  <a:pt x="1089764" y="0"/>
+                </a:cubicBezTo>
+                <a:cubicBezTo>
+                  <a:pt x="1211723" y="17157"/>
+                  <a:pt x="1602962" y="-31142"/>
+                  <a:pt x="1827769" y="0"/>
+                </a:cubicBezTo>
+                <a:cubicBezTo>
+                  <a:pt x="2052577" y="31142"/>
+                  <a:pt x="2327841" y="22608"/>
+                  <a:pt x="2614055" y="0"/>
+                </a:cubicBezTo>
+                <a:cubicBezTo>
+                  <a:pt x="2900269" y="-22608"/>
+                  <a:pt x="2992675" y="-22582"/>
+                  <a:pt x="3207217" y="0"/>
+                </a:cubicBezTo>
+                <a:cubicBezTo>
+                  <a:pt x="3421759" y="22582"/>
+                  <a:pt x="3648748" y="-2816"/>
+                  <a:pt x="3945222" y="0"/>
+                </a:cubicBezTo>
+                <a:cubicBezTo>
+                  <a:pt x="4241697" y="2816"/>
+                  <a:pt x="4615128" y="625"/>
+                  <a:pt x="4828069" y="0"/>
+                </a:cubicBezTo>
+                <a:cubicBezTo>
+                  <a:pt x="4843496" y="140643"/>
+                  <a:pt x="4811501" y="218420"/>
+                  <a:pt x="4828069" y="354372"/>
+                </a:cubicBezTo>
+                <a:cubicBezTo>
+                  <a:pt x="4844637" y="490324"/>
+                  <a:pt x="4810087" y="591197"/>
+                  <a:pt x="4828069" y="723208"/>
+                </a:cubicBezTo>
+                <a:cubicBezTo>
+                  <a:pt x="4530409" y="747739"/>
+                  <a:pt x="4327724" y="724129"/>
+                  <a:pt x="4138345" y="723208"/>
+                </a:cubicBezTo>
+                <a:cubicBezTo>
+                  <a:pt x="3948966" y="722287"/>
+                  <a:pt x="3761779" y="718481"/>
+                  <a:pt x="3496901" y="723208"/>
+                </a:cubicBezTo>
+                <a:cubicBezTo>
+                  <a:pt x="3232023" y="727935"/>
+                  <a:pt x="2954101" y="759365"/>
+                  <a:pt x="2758897" y="723208"/>
+                </a:cubicBezTo>
+                <a:cubicBezTo>
+                  <a:pt x="2563693" y="687051"/>
+                  <a:pt x="2392850" y="722775"/>
+                  <a:pt x="2214014" y="723208"/>
+                </a:cubicBezTo>
+                <a:cubicBezTo>
+                  <a:pt x="2035178" y="723641"/>
+                  <a:pt x="1705423" y="740792"/>
+                  <a:pt x="1524290" y="723208"/>
+                </a:cubicBezTo>
+                <a:cubicBezTo>
+                  <a:pt x="1343157" y="705624"/>
+                  <a:pt x="965021" y="717530"/>
+                  <a:pt x="786286" y="723208"/>
+                </a:cubicBezTo>
+                <a:cubicBezTo>
+                  <a:pt x="607551" y="728886"/>
+                  <a:pt x="186576" y="734341"/>
+                  <a:pt x="0" y="723208"/>
+                </a:cubicBezTo>
+                <a:cubicBezTo>
+                  <a:pt x="888" y="621518"/>
+                  <a:pt x="-11916" y="466612"/>
+                  <a:pt x="0" y="354372"/>
+                </a:cubicBezTo>
+                <a:cubicBezTo>
+                  <a:pt x="11916" y="242132"/>
+                  <a:pt x="8083" y="109177"/>
+                  <a:pt x="0" y="0"/>
+                </a:cubicBezTo>
+                <a:close/>
+              </a:path>
+            </a:pathLst>
+          </a:custGeom>
+          <a:ln>
+            <a:solidFill>
+              <a:schemeClr val="tx1"/>
+            </a:solidFill>
+            <a:extLst>
+              <a:ext uri="{C807C97D-BFC1-408E-A445-0C87EB9F89A2}">
+                <ask:lineSketchStyleProps xmlns:ask="http://schemas.microsoft.com/office/drawing/2018/sketchyshapes" sd="1275594984">
+                  <a:prstGeom prst="rect">
+                    <a:avLst/>
+                  </a:prstGeom>
+                  <ask:type>
+                    <ask:lineSketchFreehand/>
+                  </ask:type>
+                </ask:lineSketchStyleProps>
+              </a:ext>
+            </a:extLst>
+          </a:ln>
+        </p:spPr>
+      </p:pic>
+      <p:pic>
+        <p:nvPicPr>
+          <p:cNvPr id="14" name="Picture 13" descr="Graphical user interface, text, application, email&#10;&#10;Description automatically generated">
+            <a:extLst>
+              <a:ext uri="{FF2B5EF4-FFF2-40B4-BE49-F238E27FC236}">
+                <a16:creationId xmlns:a16="http://schemas.microsoft.com/office/drawing/2014/main" id="{D654E68F-D593-4B10-9AA2-685B0606E4C5}"/>
+              </a:ext>
+            </a:extLst>
+          </p:cNvPr>
+          <p:cNvPicPr>
+            <a:picLocks noChangeAspect="1"/>
+          </p:cNvPicPr>
+          <p:nvPr/>
+        </p:nvPicPr>
+        <p:blipFill>
+          <a:blip r:embed="rId4"/>
+          <a:stretch>
+            <a:fillRect/>
+          </a:stretch>
+        </p:blipFill>
+        <p:spPr>
+          <a:xfrm>
+            <a:off x="3084789" y="4307363"/>
+            <a:ext cx="4828069" cy="2185512"/>
+          </a:xfrm>
+          <a:custGeom>
+            <a:avLst/>
+            <a:gdLst>
+              <a:gd name="connsiteX0" fmla="*/ 0 w 4828069"/>
+              <a:gd name="connsiteY0" fmla="*/ 0 h 2185512"/>
+              <a:gd name="connsiteX1" fmla="*/ 544882 w 4828069"/>
+              <a:gd name="connsiteY1" fmla="*/ 0 h 2185512"/>
+              <a:gd name="connsiteX2" fmla="*/ 1331168 w 4828069"/>
+              <a:gd name="connsiteY2" fmla="*/ 0 h 2185512"/>
+              <a:gd name="connsiteX3" fmla="*/ 2117453 w 4828069"/>
+              <a:gd name="connsiteY3" fmla="*/ 0 h 2185512"/>
+              <a:gd name="connsiteX4" fmla="*/ 2662335 w 4828069"/>
+              <a:gd name="connsiteY4" fmla="*/ 0 h 2185512"/>
+              <a:gd name="connsiteX5" fmla="*/ 3303779 w 4828069"/>
+              <a:gd name="connsiteY5" fmla="*/ 0 h 2185512"/>
+              <a:gd name="connsiteX6" fmla="*/ 4041783 w 4828069"/>
+              <a:gd name="connsiteY6" fmla="*/ 0 h 2185512"/>
+              <a:gd name="connsiteX7" fmla="*/ 4828069 w 4828069"/>
+              <a:gd name="connsiteY7" fmla="*/ 0 h 2185512"/>
+              <a:gd name="connsiteX8" fmla="*/ 4828069 w 4828069"/>
+              <a:gd name="connsiteY8" fmla="*/ 546378 h 2185512"/>
+              <a:gd name="connsiteX9" fmla="*/ 4828069 w 4828069"/>
+              <a:gd name="connsiteY9" fmla="*/ 1136466 h 2185512"/>
+              <a:gd name="connsiteX10" fmla="*/ 4828069 w 4828069"/>
+              <a:gd name="connsiteY10" fmla="*/ 1639134 h 2185512"/>
+              <a:gd name="connsiteX11" fmla="*/ 4828069 w 4828069"/>
+              <a:gd name="connsiteY11" fmla="*/ 2185512 h 2185512"/>
+              <a:gd name="connsiteX12" fmla="*/ 4186626 w 4828069"/>
+              <a:gd name="connsiteY12" fmla="*/ 2185512 h 2185512"/>
+              <a:gd name="connsiteX13" fmla="*/ 3545182 w 4828069"/>
+              <a:gd name="connsiteY13" fmla="*/ 2185512 h 2185512"/>
+              <a:gd name="connsiteX14" fmla="*/ 2758897 w 4828069"/>
+              <a:gd name="connsiteY14" fmla="*/ 2185512 h 2185512"/>
+              <a:gd name="connsiteX15" fmla="*/ 2069172 w 4828069"/>
+              <a:gd name="connsiteY15" fmla="*/ 2185512 h 2185512"/>
+              <a:gd name="connsiteX16" fmla="*/ 1282887 w 4828069"/>
+              <a:gd name="connsiteY16" fmla="*/ 2185512 h 2185512"/>
+              <a:gd name="connsiteX17" fmla="*/ 641443 w 4828069"/>
+              <a:gd name="connsiteY17" fmla="*/ 2185512 h 2185512"/>
+              <a:gd name="connsiteX18" fmla="*/ 0 w 4828069"/>
+              <a:gd name="connsiteY18" fmla="*/ 2185512 h 2185512"/>
+              <a:gd name="connsiteX19" fmla="*/ 0 w 4828069"/>
+              <a:gd name="connsiteY19" fmla="*/ 1639134 h 2185512"/>
+              <a:gd name="connsiteX20" fmla="*/ 0 w 4828069"/>
+              <a:gd name="connsiteY20" fmla="*/ 1114611 h 2185512"/>
+              <a:gd name="connsiteX21" fmla="*/ 0 w 4828069"/>
+              <a:gd name="connsiteY21" fmla="*/ 633798 h 2185512"/>
+              <a:gd name="connsiteX22" fmla="*/ 0 w 4828069"/>
+              <a:gd name="connsiteY22" fmla="*/ 0 h 2185512"/>
+            </a:gdLst>
+            <a:ahLst/>
+            <a:cxnLst>
+              <a:cxn ang="0">
+                <a:pos x="connsiteX0" y="connsiteY0"/>
+              </a:cxn>
+              <a:cxn ang="0">
+                <a:pos x="connsiteX1" y="connsiteY1"/>
+              </a:cxn>
+              <a:cxn ang="0">
+                <a:pos x="connsiteX2" y="connsiteY2"/>
+              </a:cxn>
+              <a:cxn ang="0">
+                <a:pos x="connsiteX3" y="connsiteY3"/>
+              </a:cxn>
+              <a:cxn ang="0">
+                <a:pos x="connsiteX4" y="connsiteY4"/>
+              </a:cxn>
+              <a:cxn ang="0">
+                <a:pos x="connsiteX5" y="connsiteY5"/>
+              </a:cxn>
+              <a:cxn ang="0">
+                <a:pos x="connsiteX6" y="connsiteY6"/>
+              </a:cxn>
+              <a:cxn ang="0">
+                <a:pos x="connsiteX7" y="connsiteY7"/>
+              </a:cxn>
+              <a:cxn ang="0">
+                <a:pos x="connsiteX8" y="connsiteY8"/>
+              </a:cxn>
+              <a:cxn ang="0">
+                <a:pos x="connsiteX9" y="connsiteY9"/>
+              </a:cxn>
+              <a:cxn ang="0">
+                <a:pos x="connsiteX10" y="connsiteY10"/>
+              </a:cxn>
+              <a:cxn ang="0">
+                <a:pos x="connsiteX11" y="connsiteY11"/>
+              </a:cxn>
+              <a:cxn ang="0">
+                <a:pos x="connsiteX12" y="connsiteY12"/>
+              </a:cxn>
+              <a:cxn ang="0">
+                <a:pos x="connsiteX13" y="connsiteY13"/>
+              </a:cxn>
+              <a:cxn ang="0">
+                <a:pos x="connsiteX14" y="connsiteY14"/>
+              </a:cxn>
+              <a:cxn ang="0">
+                <a:pos x="connsiteX15" y="connsiteY15"/>
+              </a:cxn>
+              <a:cxn ang="0">
+                <a:pos x="connsiteX16" y="connsiteY16"/>
+              </a:cxn>
+              <a:cxn ang="0">
+                <a:pos x="connsiteX17" y="connsiteY17"/>
+              </a:cxn>
+              <a:cxn ang="0">
+                <a:pos x="connsiteX18" y="connsiteY18"/>
+              </a:cxn>
+              <a:cxn ang="0">
+                <a:pos x="connsiteX19" y="connsiteY19"/>
+              </a:cxn>
+              <a:cxn ang="0">
+                <a:pos x="connsiteX20" y="connsiteY20"/>
+              </a:cxn>
+              <a:cxn ang="0">
+                <a:pos x="connsiteX21" y="connsiteY21"/>
+              </a:cxn>
+              <a:cxn ang="0">
+                <a:pos x="connsiteX22" y="connsiteY22"/>
+              </a:cxn>
+            </a:cxnLst>
+            <a:rect l="l" t="t" r="r" b="b"/>
+            <a:pathLst>
+              <a:path w="4828069" h="2185512" fill="none" extrusionOk="0">
+                <a:moveTo>
+                  <a:pt x="0" y="0"/>
+                </a:moveTo>
+                <a:cubicBezTo>
+                  <a:pt x="195761" y="-19414"/>
+                  <a:pt x="375408" y="-11795"/>
+                  <a:pt x="544882" y="0"/>
+                </a:cubicBezTo>
+                <a:cubicBezTo>
+                  <a:pt x="714356" y="11795"/>
+                  <a:pt x="987805" y="14507"/>
+                  <a:pt x="1331168" y="0"/>
+                </a:cubicBezTo>
+                <a:cubicBezTo>
+                  <a:pt x="1674531" y="-14507"/>
+                  <a:pt x="1944102" y="-9546"/>
+                  <a:pt x="2117453" y="0"/>
+                </a:cubicBezTo>
+                <a:cubicBezTo>
+                  <a:pt x="2290804" y="9546"/>
+                  <a:pt x="2427153" y="-18778"/>
+                  <a:pt x="2662335" y="0"/>
+                </a:cubicBezTo>
+                <a:cubicBezTo>
+                  <a:pt x="2897517" y="18778"/>
+                  <a:pt x="2986855" y="-18903"/>
+                  <a:pt x="3303779" y="0"/>
+                </a:cubicBezTo>
+                <a:cubicBezTo>
+                  <a:pt x="3620703" y="18903"/>
+                  <a:pt x="3782220" y="14893"/>
+                  <a:pt x="4041783" y="0"/>
+                </a:cubicBezTo>
+                <a:cubicBezTo>
+                  <a:pt x="4301346" y="-14893"/>
+                  <a:pt x="4628549" y="5379"/>
+                  <a:pt x="4828069" y="0"/>
+                </a:cubicBezTo>
+                <a:cubicBezTo>
+                  <a:pt x="4832365" y="248933"/>
+                  <a:pt x="4809702" y="309148"/>
+                  <a:pt x="4828069" y="546378"/>
+                </a:cubicBezTo>
+                <a:cubicBezTo>
+                  <a:pt x="4846436" y="783608"/>
+                  <a:pt x="4849090" y="972906"/>
+                  <a:pt x="4828069" y="1136466"/>
+                </a:cubicBezTo>
+                <a:cubicBezTo>
+                  <a:pt x="4807048" y="1300026"/>
+                  <a:pt x="4826992" y="1529467"/>
+                  <a:pt x="4828069" y="1639134"/>
+                </a:cubicBezTo>
+                <a:cubicBezTo>
+                  <a:pt x="4829146" y="1748801"/>
+                  <a:pt x="4824090" y="1991200"/>
+                  <a:pt x="4828069" y="2185512"/>
+                </a:cubicBezTo>
+                <a:cubicBezTo>
+                  <a:pt x="4659854" y="2177302"/>
+                  <a:pt x="4506297" y="2169126"/>
+                  <a:pt x="4186626" y="2185512"/>
+                </a:cubicBezTo>
+                <a:cubicBezTo>
+                  <a:pt x="3866955" y="2201898"/>
+                  <a:pt x="3703964" y="2166885"/>
+                  <a:pt x="3545182" y="2185512"/>
+                </a:cubicBezTo>
+                <a:cubicBezTo>
+                  <a:pt x="3386400" y="2204139"/>
+                  <a:pt x="3151010" y="2192212"/>
+                  <a:pt x="2758897" y="2185512"/>
+                </a:cubicBezTo>
+                <a:cubicBezTo>
+                  <a:pt x="2366784" y="2178812"/>
+                  <a:pt x="2351219" y="2182494"/>
+                  <a:pt x="2069172" y="2185512"/>
+                </a:cubicBezTo>
+                <a:cubicBezTo>
+                  <a:pt x="1787126" y="2188530"/>
+                  <a:pt x="1662019" y="2210392"/>
+                  <a:pt x="1282887" y="2185512"/>
+                </a:cubicBezTo>
+                <a:cubicBezTo>
+                  <a:pt x="903755" y="2160632"/>
+                  <a:pt x="862481" y="2169936"/>
+                  <a:pt x="641443" y="2185512"/>
+                </a:cubicBezTo>
+                <a:cubicBezTo>
+                  <a:pt x="420405" y="2201088"/>
+                  <a:pt x="196995" y="2167505"/>
+                  <a:pt x="0" y="2185512"/>
+                </a:cubicBezTo>
+                <a:cubicBezTo>
+                  <a:pt x="-13303" y="2034245"/>
+                  <a:pt x="17427" y="1799367"/>
+                  <a:pt x="0" y="1639134"/>
+                </a:cubicBezTo>
+                <a:cubicBezTo>
+                  <a:pt x="-17427" y="1478901"/>
+                  <a:pt x="-13282" y="1222829"/>
+                  <a:pt x="0" y="1114611"/>
+                </a:cubicBezTo>
+                <a:cubicBezTo>
+                  <a:pt x="13282" y="1006393"/>
+                  <a:pt x="-16790" y="814599"/>
+                  <a:pt x="0" y="633798"/>
+                </a:cubicBezTo>
+                <a:cubicBezTo>
+                  <a:pt x="16790" y="452997"/>
+                  <a:pt x="-18953" y="239617"/>
+                  <a:pt x="0" y="0"/>
+                </a:cubicBezTo>
+                <a:close/>
+              </a:path>
+              <a:path w="4828069" h="2185512" stroke="0" extrusionOk="0">
+                <a:moveTo>
+                  <a:pt x="0" y="0"/>
+                </a:moveTo>
+                <a:cubicBezTo>
+                  <a:pt x="178636" y="31241"/>
+                  <a:pt x="476803" y="16231"/>
+                  <a:pt x="641443" y="0"/>
+                </a:cubicBezTo>
+                <a:cubicBezTo>
+                  <a:pt x="806083" y="-16231"/>
+                  <a:pt x="1106298" y="3407"/>
+                  <a:pt x="1234606" y="0"/>
+                </a:cubicBezTo>
+                <a:cubicBezTo>
+                  <a:pt x="1362914" y="-3407"/>
+                  <a:pt x="1689396" y="-33728"/>
+                  <a:pt x="2020892" y="0"/>
+                </a:cubicBezTo>
+                <a:cubicBezTo>
+                  <a:pt x="2352388" y="33728"/>
+                  <a:pt x="2512333" y="22075"/>
+                  <a:pt x="2710616" y="0"/>
+                </a:cubicBezTo>
+                <a:cubicBezTo>
+                  <a:pt x="2908899" y="-22075"/>
+                  <a:pt x="3241600" y="-16743"/>
+                  <a:pt x="3448621" y="0"/>
+                </a:cubicBezTo>
+                <a:cubicBezTo>
+                  <a:pt x="3655643" y="16743"/>
+                  <a:pt x="3746391" y="-1250"/>
+                  <a:pt x="3993503" y="0"/>
+                </a:cubicBezTo>
+                <a:cubicBezTo>
+                  <a:pt x="4240615" y="1250"/>
+                  <a:pt x="4429148" y="26562"/>
+                  <a:pt x="4828069" y="0"/>
+                </a:cubicBezTo>
+                <a:cubicBezTo>
+                  <a:pt x="4800913" y="198407"/>
+                  <a:pt x="4831662" y="351098"/>
+                  <a:pt x="4828069" y="590088"/>
+                </a:cubicBezTo>
+                <a:cubicBezTo>
+                  <a:pt x="4824476" y="829078"/>
+                  <a:pt x="4841350" y="920182"/>
+                  <a:pt x="4828069" y="1180176"/>
+                </a:cubicBezTo>
+                <a:cubicBezTo>
+                  <a:pt x="4814788" y="1440170"/>
+                  <a:pt x="4803765" y="1487542"/>
+                  <a:pt x="4828069" y="1682844"/>
+                </a:cubicBezTo>
+                <a:cubicBezTo>
+                  <a:pt x="4852373" y="1878146"/>
+                  <a:pt x="4805059" y="1973999"/>
+                  <a:pt x="4828069" y="2185512"/>
+                </a:cubicBezTo>
+                <a:cubicBezTo>
+                  <a:pt x="4607723" y="2171853"/>
+                  <a:pt x="4393478" y="2209339"/>
+                  <a:pt x="4283187" y="2185512"/>
+                </a:cubicBezTo>
+                <a:cubicBezTo>
+                  <a:pt x="4172896" y="2161685"/>
+                  <a:pt x="3824478" y="2157682"/>
+                  <a:pt x="3545182" y="2185512"/>
+                </a:cubicBezTo>
+                <a:cubicBezTo>
+                  <a:pt x="3265886" y="2213342"/>
+                  <a:pt x="2920230" y="2223241"/>
+                  <a:pt x="2758897" y="2185512"/>
+                </a:cubicBezTo>
+                <a:cubicBezTo>
+                  <a:pt x="2597564" y="2147783"/>
+                  <a:pt x="2232403" y="2203712"/>
+                  <a:pt x="2069172" y="2185512"/>
+                </a:cubicBezTo>
+                <a:cubicBezTo>
+                  <a:pt x="1905942" y="2167312"/>
+                  <a:pt x="1572068" y="2182367"/>
+                  <a:pt x="1282887" y="2185512"/>
+                </a:cubicBezTo>
+                <a:cubicBezTo>
+                  <a:pt x="993706" y="2188657"/>
+                  <a:pt x="910692" y="2159898"/>
+                  <a:pt x="689724" y="2185512"/>
+                </a:cubicBezTo>
+                <a:cubicBezTo>
+                  <a:pt x="468756" y="2211126"/>
+                  <a:pt x="276111" y="2205359"/>
+                  <a:pt x="0" y="2185512"/>
+                </a:cubicBezTo>
+                <a:cubicBezTo>
+                  <a:pt x="4941" y="2008079"/>
+                  <a:pt x="1131" y="1931076"/>
+                  <a:pt x="0" y="1704699"/>
+                </a:cubicBezTo>
+                <a:cubicBezTo>
+                  <a:pt x="-1131" y="1478322"/>
+                  <a:pt x="-8381" y="1461316"/>
+                  <a:pt x="0" y="1223887"/>
+                </a:cubicBezTo>
+                <a:cubicBezTo>
+                  <a:pt x="8381" y="986458"/>
+                  <a:pt x="-23798" y="843167"/>
+                  <a:pt x="0" y="699364"/>
+                </a:cubicBezTo>
+                <a:cubicBezTo>
+                  <a:pt x="23798" y="555561"/>
+                  <a:pt x="13432" y="305519"/>
+                  <a:pt x="0" y="0"/>
+                </a:cubicBezTo>
+                <a:close/>
+              </a:path>
+            </a:pathLst>
+          </a:custGeom>
+          <a:ln>
+            <a:solidFill>
+              <a:schemeClr val="tx1"/>
+            </a:solidFill>
+            <a:extLst>
+              <a:ext uri="{C807C97D-BFC1-408E-A445-0C87EB9F89A2}">
+                <ask:lineSketchStyleProps xmlns:ask="http://schemas.microsoft.com/office/drawing/2018/sketchyshapes" sd="2791272376">
+                  <a:prstGeom prst="rect">
+                    <a:avLst/>
+                  </a:prstGeom>
+                  <ask:type>
+                    <ask:lineSketchFreehand/>
+                  </ask:type>
+                </ask:lineSketchStyleProps>
+              </a:ext>
+            </a:extLst>
+          </a:ln>
+        </p:spPr>
+      </p:pic>
+      <p:pic>
+        <p:nvPicPr>
+          <p:cNvPr id="16" name="Graphic 15" descr="Cursor with solid fill">
+            <a:extLst>
+              <a:ext uri="{FF2B5EF4-FFF2-40B4-BE49-F238E27FC236}">
+                <a16:creationId xmlns:a16="http://schemas.microsoft.com/office/drawing/2014/main" id="{7FC0687E-916E-4005-B7CE-81A9447E0C27}"/>
+              </a:ext>
+            </a:extLst>
+          </p:cNvPr>
+          <p:cNvPicPr>
+            <a:picLocks noChangeAspect="1"/>
+          </p:cNvPicPr>
+          <p:nvPr/>
+        </p:nvPicPr>
+        <p:blipFill>
+          <a:blip r:embed="rId5">
+            <a:extLst>
+              <a:ext uri="{96DAC541-7B7A-43D3-8B79-37D633B846F1}">
+                <asvg:svgBlip xmlns:asvg="http://schemas.microsoft.com/office/drawing/2016/SVG/main" r:embed="rId6"/>
+              </a:ext>
+            </a:extLst>
+          </a:blip>
+          <a:stretch>
+            <a:fillRect/>
+          </a:stretch>
+        </p:blipFill>
+        <p:spPr>
+          <a:xfrm rot="1359503">
+            <a:off x="3439215" y="2376335"/>
+            <a:ext cx="375858" cy="375858"/>
+          </a:xfrm>
+          <a:prstGeom prst="rect">
+            <a:avLst/>
+          </a:prstGeom>
+        </p:spPr>
+      </p:pic>
+      <p:pic>
+        <p:nvPicPr>
+          <p:cNvPr id="18" name="Graphic 17" descr="Cursor with solid fill">
+            <a:extLst>
+              <a:ext uri="{FF2B5EF4-FFF2-40B4-BE49-F238E27FC236}">
+                <a16:creationId xmlns:a16="http://schemas.microsoft.com/office/drawing/2014/main" id="{E21B027A-ACDC-410C-A634-4A924CE64F57}"/>
+              </a:ext>
+            </a:extLst>
+          </p:cNvPr>
+          <p:cNvPicPr>
+            <a:picLocks noChangeAspect="1"/>
+          </p:cNvPicPr>
+          <p:nvPr/>
+        </p:nvPicPr>
+        <p:blipFill>
+          <a:blip r:embed="rId5">
+            <a:extLst>
+              <a:ext uri="{96DAC541-7B7A-43D3-8B79-37D633B846F1}">
+                <asvg:svgBlip xmlns:asvg="http://schemas.microsoft.com/office/drawing/2016/SVG/main" r:embed="rId6"/>
+              </a:ext>
+            </a:extLst>
+          </a:blip>
+          <a:stretch>
+            <a:fillRect/>
+          </a:stretch>
+        </p:blipFill>
+        <p:spPr>
+          <a:xfrm rot="1359503">
+            <a:off x="3654873" y="4733012"/>
+            <a:ext cx="375858" cy="375858"/>
+          </a:xfrm>
+          <a:prstGeom prst="rect">
+            <a:avLst/>
+          </a:prstGeom>
+        </p:spPr>
+      </p:pic>
+      <p:pic>
+        <p:nvPicPr>
+          <p:cNvPr id="20" name="Picture 19" descr="Graphical user interface, text, application&#10;&#10;Description automatically generated">
+            <a:extLst>
+              <a:ext uri="{FF2B5EF4-FFF2-40B4-BE49-F238E27FC236}">
+                <a16:creationId xmlns:a16="http://schemas.microsoft.com/office/drawing/2014/main" id="{4FB326CC-9A14-4F5D-8B10-6E7EBDF8F673}"/>
+              </a:ext>
+            </a:extLst>
+          </p:cNvPr>
+          <p:cNvPicPr>
+            <a:picLocks noChangeAspect="1"/>
+          </p:cNvPicPr>
+          <p:nvPr/>
+        </p:nvPicPr>
+        <p:blipFill>
+          <a:blip r:embed="rId7"/>
+          <a:stretch>
+            <a:fillRect/>
+          </a:stretch>
+        </p:blipFill>
+        <p:spPr>
+          <a:xfrm>
+            <a:off x="7235689" y="1825624"/>
+            <a:ext cx="3458815" cy="1129813"/>
+          </a:xfrm>
+          <a:custGeom>
+            <a:avLst/>
+            <a:gdLst>
+              <a:gd name="connsiteX0" fmla="*/ 0 w 3458815"/>
+              <a:gd name="connsiteY0" fmla="*/ 0 h 1129813"/>
+              <a:gd name="connsiteX1" fmla="*/ 622587 w 3458815"/>
+              <a:gd name="connsiteY1" fmla="*/ 0 h 1129813"/>
+              <a:gd name="connsiteX2" fmla="*/ 1245173 w 3458815"/>
+              <a:gd name="connsiteY2" fmla="*/ 0 h 1129813"/>
+              <a:gd name="connsiteX3" fmla="*/ 2006113 w 3458815"/>
+              <a:gd name="connsiteY3" fmla="*/ 0 h 1129813"/>
+              <a:gd name="connsiteX4" fmla="*/ 2697876 w 3458815"/>
+              <a:gd name="connsiteY4" fmla="*/ 0 h 1129813"/>
+              <a:gd name="connsiteX5" fmla="*/ 3458815 w 3458815"/>
+              <a:gd name="connsiteY5" fmla="*/ 0 h 1129813"/>
+              <a:gd name="connsiteX6" fmla="*/ 3458815 w 3458815"/>
+              <a:gd name="connsiteY6" fmla="*/ 576205 h 1129813"/>
+              <a:gd name="connsiteX7" fmla="*/ 3458815 w 3458815"/>
+              <a:gd name="connsiteY7" fmla="*/ 1129813 h 1129813"/>
+              <a:gd name="connsiteX8" fmla="*/ 2697876 w 3458815"/>
+              <a:gd name="connsiteY8" fmla="*/ 1129813 h 1129813"/>
+              <a:gd name="connsiteX9" fmla="*/ 1971525 w 3458815"/>
+              <a:gd name="connsiteY9" fmla="*/ 1129813 h 1129813"/>
+              <a:gd name="connsiteX10" fmla="*/ 1348938 w 3458815"/>
+              <a:gd name="connsiteY10" fmla="*/ 1129813 h 1129813"/>
+              <a:gd name="connsiteX11" fmla="*/ 657175 w 3458815"/>
+              <a:gd name="connsiteY11" fmla="*/ 1129813 h 1129813"/>
+              <a:gd name="connsiteX12" fmla="*/ 0 w 3458815"/>
+              <a:gd name="connsiteY12" fmla="*/ 1129813 h 1129813"/>
+              <a:gd name="connsiteX13" fmla="*/ 0 w 3458815"/>
+              <a:gd name="connsiteY13" fmla="*/ 587503 h 1129813"/>
+              <a:gd name="connsiteX14" fmla="*/ 0 w 3458815"/>
+              <a:gd name="connsiteY14" fmla="*/ 0 h 1129813"/>
+            </a:gdLst>
+            <a:ahLst/>
+            <a:cxnLst>
+              <a:cxn ang="0">
+                <a:pos x="connsiteX0" y="connsiteY0"/>
+              </a:cxn>
+              <a:cxn ang="0">
+                <a:pos x="connsiteX1" y="connsiteY1"/>
+              </a:cxn>
+              <a:cxn ang="0">
+                <a:pos x="connsiteX2" y="connsiteY2"/>
+              </a:cxn>
+              <a:cxn ang="0">
+                <a:pos x="connsiteX3" y="connsiteY3"/>
+              </a:cxn>
+              <a:cxn ang="0">
+                <a:pos x="connsiteX4" y="connsiteY4"/>
+              </a:cxn>
+              <a:cxn ang="0">
+                <a:pos x="connsiteX5" y="connsiteY5"/>
+              </a:cxn>
+              <a:cxn ang="0">
+                <a:pos x="connsiteX6" y="connsiteY6"/>
+              </a:cxn>
+              <a:cxn ang="0">
+                <a:pos x="connsiteX7" y="connsiteY7"/>
+              </a:cxn>
+              <a:cxn ang="0">
+                <a:pos x="connsiteX8" y="connsiteY8"/>
+              </a:cxn>
+              <a:cxn ang="0">
+                <a:pos x="connsiteX9" y="connsiteY9"/>
+              </a:cxn>
+              <a:cxn ang="0">
+                <a:pos x="connsiteX10" y="connsiteY10"/>
+              </a:cxn>
+              <a:cxn ang="0">
+                <a:pos x="connsiteX11" y="connsiteY11"/>
+              </a:cxn>
+              <a:cxn ang="0">
+                <a:pos x="connsiteX12" y="connsiteY12"/>
+              </a:cxn>
+              <a:cxn ang="0">
+                <a:pos x="connsiteX13" y="connsiteY13"/>
+              </a:cxn>
+              <a:cxn ang="0">
+                <a:pos x="connsiteX14" y="connsiteY14"/>
+              </a:cxn>
+            </a:cxnLst>
+            <a:rect l="l" t="t" r="r" b="b"/>
+            <a:pathLst>
+              <a:path w="3458815" h="1129813" fill="none" extrusionOk="0">
+                <a:moveTo>
+                  <a:pt x="0" y="0"/>
+                </a:moveTo>
+                <a:cubicBezTo>
+                  <a:pt x="165805" y="7269"/>
+                  <a:pt x="444028" y="-20232"/>
+                  <a:pt x="622587" y="0"/>
+                </a:cubicBezTo>
+                <a:cubicBezTo>
+                  <a:pt x="801146" y="20232"/>
+                  <a:pt x="985766" y="-23648"/>
+                  <a:pt x="1245173" y="0"/>
+                </a:cubicBezTo>
+                <a:cubicBezTo>
+                  <a:pt x="1504580" y="23648"/>
+                  <a:pt x="1656085" y="-14965"/>
+                  <a:pt x="2006113" y="0"/>
+                </a:cubicBezTo>
+                <a:cubicBezTo>
+                  <a:pt x="2356141" y="14965"/>
+                  <a:pt x="2514032" y="2049"/>
+                  <a:pt x="2697876" y="0"/>
+                </a:cubicBezTo>
+                <a:cubicBezTo>
+                  <a:pt x="2881720" y="-2049"/>
+                  <a:pt x="3100545" y="27915"/>
+                  <a:pt x="3458815" y="0"/>
+                </a:cubicBezTo>
+                <a:cubicBezTo>
+                  <a:pt x="3465899" y="135595"/>
+                  <a:pt x="3474479" y="379707"/>
+                  <a:pt x="3458815" y="576205"/>
+                </a:cubicBezTo>
+                <a:cubicBezTo>
+                  <a:pt x="3443151" y="772704"/>
+                  <a:pt x="3476120" y="875669"/>
+                  <a:pt x="3458815" y="1129813"/>
+                </a:cubicBezTo>
+                <a:cubicBezTo>
+                  <a:pt x="3284355" y="1132336"/>
+                  <a:pt x="2928778" y="1118706"/>
+                  <a:pt x="2697876" y="1129813"/>
+                </a:cubicBezTo>
+                <a:cubicBezTo>
+                  <a:pt x="2466974" y="1140920"/>
+                  <a:pt x="2205962" y="1125220"/>
+                  <a:pt x="1971525" y="1129813"/>
+                </a:cubicBezTo>
+                <a:cubicBezTo>
+                  <a:pt x="1737088" y="1134406"/>
+                  <a:pt x="1474497" y="1139357"/>
+                  <a:pt x="1348938" y="1129813"/>
+                </a:cubicBezTo>
+                <a:cubicBezTo>
+                  <a:pt x="1223379" y="1120269"/>
+                  <a:pt x="869781" y="1115285"/>
+                  <a:pt x="657175" y="1129813"/>
+                </a:cubicBezTo>
+                <a:cubicBezTo>
+                  <a:pt x="444569" y="1144341"/>
+                  <a:pt x="277113" y="1112524"/>
+                  <a:pt x="0" y="1129813"/>
+                </a:cubicBezTo>
+                <a:cubicBezTo>
+                  <a:pt x="-17682" y="993184"/>
+                  <a:pt x="-19894" y="807599"/>
+                  <a:pt x="0" y="587503"/>
+                </a:cubicBezTo>
+                <a:cubicBezTo>
+                  <a:pt x="19894" y="367407"/>
+                  <a:pt x="19321" y="288487"/>
+                  <a:pt x="0" y="0"/>
+                </a:cubicBezTo>
+                <a:close/>
+              </a:path>
+              <a:path w="3458815" h="1129813" stroke="0" extrusionOk="0">
+                <a:moveTo>
+                  <a:pt x="0" y="0"/>
+                </a:moveTo>
+                <a:cubicBezTo>
+                  <a:pt x="322192" y="-11252"/>
+                  <a:pt x="513881" y="-14520"/>
+                  <a:pt x="760939" y="0"/>
+                </a:cubicBezTo>
+                <a:cubicBezTo>
+                  <a:pt x="1007997" y="14520"/>
+                  <a:pt x="1274938" y="16772"/>
+                  <a:pt x="1452702" y="0"/>
+                </a:cubicBezTo>
+                <a:cubicBezTo>
+                  <a:pt x="1630466" y="-16772"/>
+                  <a:pt x="1827979" y="29686"/>
+                  <a:pt x="2075289" y="0"/>
+                </a:cubicBezTo>
+                <a:cubicBezTo>
+                  <a:pt x="2322599" y="-29686"/>
+                  <a:pt x="2582419" y="-12087"/>
+                  <a:pt x="2767052" y="0"/>
+                </a:cubicBezTo>
+                <a:cubicBezTo>
+                  <a:pt x="2951685" y="12087"/>
+                  <a:pt x="3190015" y="26655"/>
+                  <a:pt x="3458815" y="0"/>
+                </a:cubicBezTo>
+                <a:cubicBezTo>
+                  <a:pt x="3471554" y="275502"/>
+                  <a:pt x="3440201" y="356627"/>
+                  <a:pt x="3458815" y="576205"/>
+                </a:cubicBezTo>
+                <a:cubicBezTo>
+                  <a:pt x="3477429" y="795784"/>
+                  <a:pt x="3484441" y="907366"/>
+                  <a:pt x="3458815" y="1129813"/>
+                </a:cubicBezTo>
+                <a:cubicBezTo>
+                  <a:pt x="3109814" y="1098672"/>
+                  <a:pt x="3037383" y="1149134"/>
+                  <a:pt x="2732464" y="1129813"/>
+                </a:cubicBezTo>
+                <a:cubicBezTo>
+                  <a:pt x="2427545" y="1110492"/>
+                  <a:pt x="2177123" y="1115401"/>
+                  <a:pt x="1971525" y="1129813"/>
+                </a:cubicBezTo>
+                <a:cubicBezTo>
+                  <a:pt x="1765927" y="1144225"/>
+                  <a:pt x="1537278" y="1123231"/>
+                  <a:pt x="1210585" y="1129813"/>
+                </a:cubicBezTo>
+                <a:cubicBezTo>
+                  <a:pt x="883892" y="1136395"/>
+                  <a:pt x="410238" y="1154120"/>
+                  <a:pt x="0" y="1129813"/>
+                </a:cubicBezTo>
+                <a:cubicBezTo>
+                  <a:pt x="-135" y="874810"/>
+                  <a:pt x="21097" y="825540"/>
+                  <a:pt x="0" y="542310"/>
+                </a:cubicBezTo>
+                <a:cubicBezTo>
+                  <a:pt x="-21097" y="259080"/>
+                  <a:pt x="-6038" y="120083"/>
+                  <a:pt x="0" y="0"/>
+                </a:cubicBezTo>
+                <a:close/>
+              </a:path>
+            </a:pathLst>
+          </a:custGeom>
+          <a:ln>
+            <a:solidFill>
+              <a:schemeClr val="tx1"/>
+            </a:solidFill>
+            <a:extLst>
+              <a:ext uri="{C807C97D-BFC1-408E-A445-0C87EB9F89A2}">
+                <ask:lineSketchStyleProps xmlns:ask="http://schemas.microsoft.com/office/drawing/2018/sketchyshapes" sd="712207259">
+                  <a:prstGeom prst="rect">
+                    <a:avLst/>
+                  </a:prstGeom>
+                  <ask:type>
+                    <ask:lineSketchFreehand/>
+                  </ask:type>
+                </ask:lineSketchStyleProps>
+              </a:ext>
+            </a:extLst>
+          </a:ln>
+        </p:spPr>
+      </p:pic>
+      <p:pic>
+        <p:nvPicPr>
+          <p:cNvPr id="21" name="Graphic 20" descr="Cursor with solid fill">
+            <a:extLst>
+              <a:ext uri="{FF2B5EF4-FFF2-40B4-BE49-F238E27FC236}">
+                <a16:creationId xmlns:a16="http://schemas.microsoft.com/office/drawing/2014/main" id="{1D37766E-7E6F-434E-8A50-E289A75E014B}"/>
+              </a:ext>
+            </a:extLst>
+          </p:cNvPr>
+          <p:cNvPicPr>
+            <a:picLocks noChangeAspect="1"/>
+          </p:cNvPicPr>
+          <p:nvPr/>
+        </p:nvPicPr>
+        <p:blipFill>
+          <a:blip r:embed="rId5">
+            <a:extLst>
+              <a:ext uri="{96DAC541-7B7A-43D3-8B79-37D633B846F1}">
+                <asvg:svgBlip xmlns:asvg="http://schemas.microsoft.com/office/drawing/2016/SVG/main" r:embed="rId6"/>
+              </a:ext>
+            </a:extLst>
+          </a:blip>
+          <a:stretch>
+            <a:fillRect/>
+          </a:stretch>
+        </p:blipFill>
+        <p:spPr>
+          <a:xfrm rot="1359503">
+            <a:off x="7338875" y="2439384"/>
+            <a:ext cx="375858" cy="375858"/>
+          </a:xfrm>
+          <a:prstGeom prst="rect">
+            <a:avLst/>
+          </a:prstGeom>
+        </p:spPr>
+      </p:pic>
+    </p:spTree>
+    <p:extLst>
+      <p:ext uri="{BB962C8B-B14F-4D97-AF65-F5344CB8AC3E}">
+        <p14:creationId xmlns:p14="http://schemas.microsoft.com/office/powerpoint/2010/main" val="673719776"/>
+      </p:ext>
+    </p:extLst>
+  </p:cSld>
+  <p:clrMapOvr>
+    <a:masterClrMapping/>
+  </p:clrMapOvr>
+</p:sld>
+</file>
+
+<file path=ppt/slides/slide6.xml><?xml version="1.0" encoding="utf-8"?>
+<p:sld xmlns:a="http://schemas.openxmlformats.org/drawingml/2006/main" xmlns:r="http://schemas.openxmlformats.org/officeDocument/2006/relationships" xmlns:p="http://schemas.openxmlformats.org/presentationml/2006/main">
+  <p:cSld>
+    <p:spTree>
+      <p:nvGrpSpPr>
+        <p:cNvPr id="1" name=""/>
+        <p:cNvGrpSpPr/>
+        <p:nvPr/>
+      </p:nvGrpSpPr>
+      <p:grpSpPr>
+        <a:xfrm>
+          <a:off x="0" y="0"/>
+          <a:ext cx="0" cy="0"/>
+          <a:chOff x="0" y="0"/>
+          <a:chExt cx="0" cy="0"/>
+        </a:xfrm>
+      </p:grpSpPr>
+      <p:sp>
+        <p:nvSpPr>
+          <p:cNvPr id="2" name="Title 1">
+            <a:extLst>
+              <a:ext uri="{FF2B5EF4-FFF2-40B4-BE49-F238E27FC236}">
+                <a16:creationId xmlns:a16="http://schemas.microsoft.com/office/drawing/2014/main" id="{94DC989D-F244-4BA1-8291-1934EBBE071B}"/>
+              </a:ext>
+            </a:extLst>
+          </p:cNvPr>
+          <p:cNvSpPr>
+            <a:spLocks noGrp="1"/>
+          </p:cNvSpPr>
+          <p:nvPr>
+            <p:ph type="title"/>
+          </p:nvPr>
+        </p:nvSpPr>
+        <p:spPr/>
+        <p:txBody>
+          <a:bodyPr/>
+          <a:lstStyle/>
+          <a:p>
+            <a:r>
+              <a:rPr lang="en-GB"/>
+              <a:t>Functions</a:t>
+            </a:r>
+            <a:endParaRPr lang="en-US"/>
+          </a:p>
+        </p:txBody>
+      </p:sp>
+      <p:sp>
+        <p:nvSpPr>
+          <p:cNvPr id="3" name="Text Placeholder 2">
+            <a:extLst>
+              <a:ext uri="{FF2B5EF4-FFF2-40B4-BE49-F238E27FC236}">
+                <a16:creationId xmlns:a16="http://schemas.microsoft.com/office/drawing/2014/main" id="{221F436D-F3EA-4762-B84C-A1CDBBDE624B}"/>
+              </a:ext>
+            </a:extLst>
+          </p:cNvPr>
+          <p:cNvSpPr>
+            <a:spLocks noGrp="1"/>
+          </p:cNvSpPr>
+          <p:nvPr>
+            <p:ph type="body" idx="1"/>
+          </p:nvPr>
+        </p:nvSpPr>
+        <p:spPr/>
+        <p:txBody>
+          <a:bodyPr/>
+          <a:lstStyle/>
+          <a:p>
+            <a:r>
+              <a:rPr lang="en-GB"/>
+              <a:t>Index Page</a:t>
+            </a:r>
+            <a:endParaRPr lang="en-US"/>
+          </a:p>
+        </p:txBody>
+      </p:sp>
+      <p:sp>
+        <p:nvSpPr>
+          <p:cNvPr id="4" name="Content Placeholder 3">
+            <a:extLst>
+              <a:ext uri="{FF2B5EF4-FFF2-40B4-BE49-F238E27FC236}">
+                <a16:creationId xmlns:a16="http://schemas.microsoft.com/office/drawing/2014/main" id="{514A5A08-0F3D-489B-AC19-A0929C58B51C}"/>
+              </a:ext>
+            </a:extLst>
+          </p:cNvPr>
+          <p:cNvSpPr>
+            <a:spLocks noGrp="1"/>
+          </p:cNvSpPr>
+          <p:nvPr>
+            <p:ph sz="half" idx="2"/>
+          </p:nvPr>
+        </p:nvSpPr>
+        <p:spPr/>
+        <p:txBody>
+          <a:bodyPr>
+            <a:normAutofit/>
+          </a:bodyPr>
+          <a:lstStyle/>
+          <a:p>
+            <a:pPr>
+              <a:lnSpc>
+                <a:spcPct val="150000"/>
+              </a:lnSpc>
+            </a:pPr>
+            <a:endParaRPr lang="en-US" b="0">
+              <a:effectLst/>
+              <a:latin typeface="consolas" panose="020B0609020204030204" pitchFamily="49" charset="0"/>
+            </a:endParaRPr>
+          </a:p>
+          <a:p>
+            <a:pPr>
+              <a:lnSpc>
+                <a:spcPct val="150000"/>
+              </a:lnSpc>
+            </a:pPr>
+            <a:r>
+              <a:rPr lang="en-US" b="0">
+                <a:effectLst/>
+                <a:latin typeface="consolas" panose="020B0609020204030204" pitchFamily="49" charset="0"/>
+              </a:rPr>
+              <a:t>enable/disable button</a:t>
+            </a:r>
+          </a:p>
+          <a:p>
+            <a:pPr>
+              <a:lnSpc>
+                <a:spcPct val="150000"/>
+              </a:lnSpc>
+            </a:pPr>
+            <a:r>
+              <a:rPr lang="en-US" b="0">
+                <a:effectLst/>
+                <a:latin typeface="consolas" panose="020B0609020204030204" pitchFamily="49" charset="0"/>
+              </a:rPr>
+              <a:t>set table visibility</a:t>
+            </a:r>
+          </a:p>
+          <a:p>
+            <a:pPr>
+              <a:lnSpc>
+                <a:spcPct val="150000"/>
+              </a:lnSpc>
+            </a:pPr>
+            <a:r>
+              <a:rPr lang="en-US" b="0">
+                <a:effectLst/>
+                <a:latin typeface="consolas" panose="020B0609020204030204" pitchFamily="49" charset="0"/>
+              </a:rPr>
+              <a:t>sort/reset table</a:t>
+            </a:r>
+          </a:p>
+          <a:p>
+            <a:pPr>
+              <a:lnSpc>
+                <a:spcPct val="150000"/>
+              </a:lnSpc>
+            </a:pPr>
+            <a:r>
+              <a:rPr lang="en-US" b="0">
+                <a:effectLst/>
+                <a:latin typeface="consolas" panose="020B0609020204030204" pitchFamily="49" charset="0"/>
+              </a:rPr>
+              <a:t>create/delete row</a:t>
+            </a:r>
+          </a:p>
+        </p:txBody>
+      </p:sp>
+      <p:sp>
+        <p:nvSpPr>
+          <p:cNvPr id="5" name="Text Placeholder 4">
+            <a:extLst>
+              <a:ext uri="{FF2B5EF4-FFF2-40B4-BE49-F238E27FC236}">
+                <a16:creationId xmlns:a16="http://schemas.microsoft.com/office/drawing/2014/main" id="{C1BB67F3-695B-4E12-BD62-8147BA9BB0F8}"/>
+              </a:ext>
+            </a:extLst>
+          </p:cNvPr>
+          <p:cNvSpPr>
+            <a:spLocks noGrp="1"/>
+          </p:cNvSpPr>
+          <p:nvPr>
+            <p:ph type="body" sz="quarter" idx="3"/>
+          </p:nvPr>
+        </p:nvSpPr>
+        <p:spPr/>
+        <p:txBody>
+          <a:bodyPr/>
+          <a:lstStyle/>
+          <a:p>
+            <a:r>
+              <a:rPr lang="en-GB"/>
+              <a:t>About Page</a:t>
+            </a:r>
+            <a:endParaRPr lang="en-US"/>
+          </a:p>
+        </p:txBody>
+      </p:sp>
+      <p:sp>
+        <p:nvSpPr>
+          <p:cNvPr id="6" name="Content Placeholder 5">
+            <a:extLst>
+              <a:ext uri="{FF2B5EF4-FFF2-40B4-BE49-F238E27FC236}">
+                <a16:creationId xmlns:a16="http://schemas.microsoft.com/office/drawing/2014/main" id="{64585DE4-0381-488E-A4E8-BD5003C451E0}"/>
+              </a:ext>
+            </a:extLst>
+          </p:cNvPr>
+          <p:cNvSpPr>
+            <a:spLocks noGrp="1"/>
+          </p:cNvSpPr>
+          <p:nvPr>
+            <p:ph sz="quarter" idx="4"/>
+          </p:nvPr>
+        </p:nvSpPr>
+        <p:spPr/>
+        <p:txBody>
+          <a:bodyPr vert="horz" lIns="91440" tIns="45720" rIns="91440" bIns="45720" rtlCol="0">
+            <a:normAutofit/>
+          </a:bodyPr>
+          <a:lstStyle/>
+          <a:p>
+            <a:pPr>
+              <a:lnSpc>
+                <a:spcPct val="150000"/>
+              </a:lnSpc>
+            </a:pPr>
+            <a:endParaRPr lang="en-US">
+              <a:latin typeface="consolas" panose="020B0609020204030204" pitchFamily="49" charset="0"/>
+            </a:endParaRPr>
+          </a:p>
+          <a:p>
+            <a:pPr>
+              <a:lnSpc>
+                <a:spcPct val="150000"/>
+              </a:lnSpc>
+            </a:pPr>
+            <a:r>
+              <a:rPr lang="en-US">
+                <a:latin typeface="consolas" panose="020B0609020204030204" pitchFamily="49" charset="0"/>
+              </a:rPr>
+              <a:t>set font bold/normal</a:t>
+            </a:r>
+          </a:p>
+          <a:p>
+            <a:pPr>
+              <a:lnSpc>
+                <a:spcPct val="150000"/>
+              </a:lnSpc>
+            </a:pPr>
+            <a:r>
+              <a:rPr lang="en-US">
+                <a:latin typeface="consolas" panose="020B0609020204030204" pitchFamily="49" charset="0"/>
+              </a:rPr>
+              <a:t>change text value</a:t>
+            </a:r>
+          </a:p>
+          <a:p>
+            <a:pPr>
+              <a:lnSpc>
+                <a:spcPct val="150000"/>
+              </a:lnSpc>
+            </a:pPr>
+            <a:r>
+              <a:rPr lang="en-US">
+                <a:latin typeface="consolas" panose="020B0609020204030204" pitchFamily="49" charset="0"/>
+              </a:rPr>
+              <a:t>animate card</a:t>
+            </a:r>
+          </a:p>
+          <a:p>
+            <a:endParaRPr lang="en-US">
+              <a:latin typeface="consolas" panose="020B0609020204030204" pitchFamily="49" charset="0"/>
+            </a:endParaRPr>
+          </a:p>
+        </p:txBody>
+      </p:sp>
+    </p:spTree>
+    <p:extLst>
+      <p:ext uri="{BB962C8B-B14F-4D97-AF65-F5344CB8AC3E}">
+        <p14:creationId xmlns:p14="http://schemas.microsoft.com/office/powerpoint/2010/main" val="2205407964"/>
+      </p:ext>
+    </p:extLst>
+  </p:cSld>
+  <p:clrMapOvr>
+    <a:masterClrMapping/>
+  </p:clrMapOvr>
+</p:sld>
+</file>
+
+<file path=ppt/slides/slide7.xml><?xml version="1.0" encoding="utf-8"?>
+<p:sld xmlns:a="http://schemas.openxmlformats.org/drawingml/2006/main" xmlns:r="http://schemas.openxmlformats.org/officeDocument/2006/relationships" xmlns:p="http://schemas.openxmlformats.org/presentationml/2006/main">
+  <p:cSld>
+    <p:spTree>
+      <p:nvGrpSpPr>
+        <p:cNvPr id="1" name=""/>
+        <p:cNvGrpSpPr/>
+        <p:nvPr/>
+      </p:nvGrpSpPr>
+      <p:grpSpPr>
+        <a:xfrm>
+          <a:off x="0" y="0"/>
+          <a:ext cx="0" cy="0"/>
+          <a:chOff x="0" y="0"/>
+          <a:chExt cx="0" cy="0"/>
+        </a:xfrm>
+      </p:grpSpPr>
+      <p:sp>
+        <p:nvSpPr>
+          <p:cNvPr id="2" name="Title 1">
+            <a:extLst>
+              <a:ext uri="{FF2B5EF4-FFF2-40B4-BE49-F238E27FC236}">
+                <a16:creationId xmlns:a16="http://schemas.microsoft.com/office/drawing/2014/main" id="{D5516651-704E-49D1-A9D4-E879A6A621A9}"/>
+              </a:ext>
+            </a:extLst>
+          </p:cNvPr>
+          <p:cNvSpPr>
+            <a:spLocks noGrp="1"/>
+          </p:cNvSpPr>
+          <p:nvPr>
+            <p:ph type="ctrTitle"/>
+          </p:nvPr>
+        </p:nvSpPr>
+        <p:spPr/>
+        <p:txBody>
+          <a:bodyPr/>
+          <a:lstStyle/>
+          <a:p>
+            <a:r>
+              <a:rPr lang="en-GB"/>
+              <a:t>demonstration</a:t>
+            </a:r>
+            <a:endParaRPr lang="en-US"/>
+          </a:p>
+        </p:txBody>
+      </p:sp>
+      <p:sp>
+        <p:nvSpPr>
+          <p:cNvPr id="3" name="Subtitle 2">
+            <a:extLst>
+              <a:ext uri="{FF2B5EF4-FFF2-40B4-BE49-F238E27FC236}">
+                <a16:creationId xmlns:a16="http://schemas.microsoft.com/office/drawing/2014/main" id="{2E05AADE-CF00-4D11-B49F-82AFA9CD6818}"/>
+              </a:ext>
+            </a:extLst>
+          </p:cNvPr>
+          <p:cNvSpPr>
+            <a:spLocks noGrp="1"/>
+          </p:cNvSpPr>
+          <p:nvPr>
+            <p:ph type="subTitle" idx="1"/>
+          </p:nvPr>
+        </p:nvSpPr>
+        <p:spPr/>
+        <p:txBody>
+          <a:bodyPr anchor="b">
+            <a:normAutofit/>
+          </a:bodyPr>
+          <a:lstStyle/>
+          <a:p>
+            <a:r>
+              <a:rPr lang="en-GB" sz="2400"/>
+              <a:t>“I saw my life flash before my eyes</a:t>
+            </a:r>
+          </a:p>
+          <a:p>
+            <a:r>
+              <a:rPr lang="en-GB" sz="2400"/>
+              <a:t>and all I could see was a close tag”</a:t>
+            </a:r>
+            <a:endParaRPr lang="en-US" sz="2400"/>
+          </a:p>
+        </p:txBody>
+      </p:sp>
+    </p:spTree>
+    <p:extLst>
+      <p:ext uri="{BB962C8B-B14F-4D97-AF65-F5344CB8AC3E}">
+        <p14:creationId xmlns:p14="http://schemas.microsoft.com/office/powerpoint/2010/main" val="2004160048"/>
       </p:ext>
     </p:extLst>
   </p:cSld>

</xml_diff>